<commit_message>
Actualizar modelos de la bd en documentos entregables
</commit_message>
<xml_diff>
--- a/Documentos aula virtual/Grupo 2 - Semana 1.pptx
+++ b/Documentos aula virtual/Grupo 2 - Semana 1.pptx
@@ -136,705 +136,24 @@
 <file path=ppt/changesInfos/changesInfo1.xml><?xml version="1.0" encoding="utf-8"?>
 <pc:chgInfo xmlns:a="http://schemas.openxmlformats.org/drawingml/2006/main" xmlns:r="http://schemas.openxmlformats.org/officeDocument/2006/relationships" xmlns:ac="http://schemas.microsoft.com/office/drawing/2013/main/command" xmlns:pc="http://schemas.microsoft.com/office/powerpoint/2013/main/command">
   <pc:docChgLst>
-    <pc:chgData name="CACERES CASTRO XIMENA LIZETH" userId="f563d6b3-b530-416d-a121-a47ff68979ea" providerId="ADAL" clId="{1F03FFFF-2808-4650-8B6F-6016474D36FF}"/>
-    <pc:docChg chg="undo custSel addSld delSld modSld">
-      <pc:chgData name="CACERES CASTRO XIMENA LIZETH" userId="f563d6b3-b530-416d-a121-a47ff68979ea" providerId="ADAL" clId="{1F03FFFF-2808-4650-8B6F-6016474D36FF}" dt="2022-03-10T04:01:31.860" v="288" actId="962"/>
+    <pc:chgData name="Usuario invitado" userId="S::urn:spo:anon#416cc96c5a3d7e9fc3bf7bce4ff7d30c927622a9fd6272cd08bafe94d85b1603::" providerId="AD" clId="Web-{30964437-2AAC-4A10-9742-A5F15A6E61AC}"/>
+    <pc:docChg chg="modSld">
+      <pc:chgData name="Usuario invitado" userId="S::urn:spo:anon#416cc96c5a3d7e9fc3bf7bce4ff7d30c927622a9fd6272cd08bafe94d85b1603::" providerId="AD" clId="Web-{30964437-2AAC-4A10-9742-A5F15A6E61AC}" dt="2022-03-10T14:49:33.683" v="0" actId="1076"/>
       <pc:docMkLst>
         <pc:docMk/>
       </pc:docMkLst>
-      <pc:sldChg chg="modSp mod">
-        <pc:chgData name="CACERES CASTRO XIMENA LIZETH" userId="f563d6b3-b530-416d-a121-a47ff68979ea" providerId="ADAL" clId="{1F03FFFF-2808-4650-8B6F-6016474D36FF}" dt="2022-03-02T18:05:08.442" v="157" actId="113"/>
+      <pc:sldChg chg="modSp">
+        <pc:chgData name="Usuario invitado" userId="S::urn:spo:anon#416cc96c5a3d7e9fc3bf7bce4ff7d30c927622a9fd6272cd08bafe94d85b1603::" providerId="AD" clId="Web-{30964437-2AAC-4A10-9742-A5F15A6E61AC}" dt="2022-03-10T14:49:33.683" v="0" actId="1076"/>
         <pc:sldMkLst>
           <pc:docMk/>
           <pc:sldMk cId="1324508986" sldId="257"/>
         </pc:sldMkLst>
-        <pc:spChg chg="mod">
-          <ac:chgData name="CACERES CASTRO XIMENA LIZETH" userId="f563d6b3-b530-416d-a121-a47ff68979ea" providerId="ADAL" clId="{1F03FFFF-2808-4650-8B6F-6016474D36FF}" dt="2022-03-02T18:05:08.442" v="157" actId="113"/>
-          <ac:spMkLst>
+        <pc:picChg chg="mod">
+          <ac:chgData name="Usuario invitado" userId="S::urn:spo:anon#416cc96c5a3d7e9fc3bf7bce4ff7d30c927622a9fd6272cd08bafe94d85b1603::" providerId="AD" clId="Web-{30964437-2AAC-4A10-9742-A5F15A6E61AC}" dt="2022-03-10T14:49:33.683" v="0" actId="1076"/>
+          <ac:picMkLst>
             <pc:docMk/>
             <pc:sldMk cId="1324508986" sldId="257"/>
-            <ac:spMk id="2" creationId="{6E14B5F6-1BA0-4A42-B973-7CD1B07FDCE3}"/>
-          </ac:spMkLst>
-        </pc:spChg>
-      </pc:sldChg>
-      <pc:sldChg chg="addSp delSp modSp mod setBg addAnim modAnim">
-        <pc:chgData name="CACERES CASTRO XIMENA LIZETH" userId="f563d6b3-b530-416d-a121-a47ff68979ea" providerId="ADAL" clId="{1F03FFFF-2808-4650-8B6F-6016474D36FF}" dt="2022-03-02T18:04:58.810" v="155" actId="113"/>
-        <pc:sldMkLst>
-          <pc:docMk/>
-          <pc:sldMk cId="1796714290" sldId="264"/>
-        </pc:sldMkLst>
-        <pc:spChg chg="mod">
-          <ac:chgData name="CACERES CASTRO XIMENA LIZETH" userId="f563d6b3-b530-416d-a121-a47ff68979ea" providerId="ADAL" clId="{1F03FFFF-2808-4650-8B6F-6016474D36FF}" dt="2022-03-02T18:04:58.810" v="155" actId="113"/>
-          <ac:spMkLst>
-            <pc:docMk/>
-            <pc:sldMk cId="1796714290" sldId="264"/>
-            <ac:spMk id="2" creationId="{FD4557E2-C4D0-4E10-9F91-29113A7F0DA5}"/>
-          </ac:spMkLst>
-        </pc:spChg>
-        <pc:spChg chg="mod">
-          <ac:chgData name="CACERES CASTRO XIMENA LIZETH" userId="f563d6b3-b530-416d-a121-a47ff68979ea" providerId="ADAL" clId="{1F03FFFF-2808-4650-8B6F-6016474D36FF}" dt="2022-03-02T18:04:43.918" v="154" actId="403"/>
-          <ac:spMkLst>
-            <pc:docMk/>
-            <pc:sldMk cId="1796714290" sldId="264"/>
-            <ac:spMk id="3" creationId="{FBC0CC10-2E4D-4F58-9470-3AF9AB02377B}"/>
-          </ac:spMkLst>
-        </pc:spChg>
-        <pc:spChg chg="add del">
-          <ac:chgData name="CACERES CASTRO XIMENA LIZETH" userId="f563d6b3-b530-416d-a121-a47ff68979ea" providerId="ADAL" clId="{1F03FFFF-2808-4650-8B6F-6016474D36FF}" dt="2022-03-02T18:00:05.273" v="68" actId="26606"/>
-          <ac:spMkLst>
-            <pc:docMk/>
-            <pc:sldMk cId="1796714290" sldId="264"/>
-            <ac:spMk id="8" creationId="{907EF6B7-1338-4443-8C46-6A318D952DFD}"/>
-          </ac:spMkLst>
-        </pc:spChg>
-        <pc:spChg chg="add del">
-          <ac:chgData name="CACERES CASTRO XIMENA LIZETH" userId="f563d6b3-b530-416d-a121-a47ff68979ea" providerId="ADAL" clId="{1F03FFFF-2808-4650-8B6F-6016474D36FF}" dt="2022-03-02T18:00:05.273" v="68" actId="26606"/>
-          <ac:spMkLst>
-            <pc:docMk/>
-            <pc:sldMk cId="1796714290" sldId="264"/>
-            <ac:spMk id="10" creationId="{DAAE4CDD-124C-4DCF-9584-B6033B545DD5}"/>
-          </ac:spMkLst>
-        </pc:spChg>
-        <pc:spChg chg="add del">
-          <ac:chgData name="CACERES CASTRO XIMENA LIZETH" userId="f563d6b3-b530-416d-a121-a47ff68979ea" providerId="ADAL" clId="{1F03FFFF-2808-4650-8B6F-6016474D36FF}" dt="2022-03-02T18:00:05.273" v="68" actId="26606"/>
-          <ac:spMkLst>
-            <pc:docMk/>
-            <pc:sldMk cId="1796714290" sldId="264"/>
-            <ac:spMk id="12" creationId="{081E4A58-353D-44AE-B2FC-2A74E2E400F7}"/>
-          </ac:spMkLst>
-        </pc:spChg>
-        <pc:spChg chg="add del">
-          <ac:chgData name="CACERES CASTRO XIMENA LIZETH" userId="f563d6b3-b530-416d-a121-a47ff68979ea" providerId="ADAL" clId="{1F03FFFF-2808-4650-8B6F-6016474D36FF}" dt="2022-03-02T18:00:34.763" v="71" actId="26606"/>
-          <ac:spMkLst>
-            <pc:docMk/>
-            <pc:sldMk cId="1796714290" sldId="264"/>
-            <ac:spMk id="17" creationId="{8E2CC403-21CD-41DF-BAC4-329D7FF03C5C}"/>
-          </ac:spMkLst>
-        </pc:spChg>
-        <pc:spChg chg="add del">
-          <ac:chgData name="CACERES CASTRO XIMENA LIZETH" userId="f563d6b3-b530-416d-a121-a47ff68979ea" providerId="ADAL" clId="{1F03FFFF-2808-4650-8B6F-6016474D36FF}" dt="2022-03-02T18:00:34.763" v="71" actId="26606"/>
-          <ac:spMkLst>
-            <pc:docMk/>
-            <pc:sldMk cId="1796714290" sldId="264"/>
-            <ac:spMk id="24" creationId="{7653717E-6F8C-43E0-9893-C03AE87D18D6}"/>
-          </ac:spMkLst>
-        </pc:spChg>
-        <pc:spChg chg="add del">
-          <ac:chgData name="CACERES CASTRO XIMENA LIZETH" userId="f563d6b3-b530-416d-a121-a47ff68979ea" providerId="ADAL" clId="{1F03FFFF-2808-4650-8B6F-6016474D36FF}" dt="2022-03-02T18:00:34.763" v="71" actId="26606"/>
-          <ac:spMkLst>
-            <pc:docMk/>
-            <pc:sldMk cId="1796714290" sldId="264"/>
-            <ac:spMk id="26" creationId="{35BB14B4-EC3F-47C7-9AF3-B0E017B75C42}"/>
-          </ac:spMkLst>
-        </pc:spChg>
-        <pc:spChg chg="add del">
-          <ac:chgData name="CACERES CASTRO XIMENA LIZETH" userId="f563d6b3-b530-416d-a121-a47ff68979ea" providerId="ADAL" clId="{1F03FFFF-2808-4650-8B6F-6016474D36FF}" dt="2022-03-02T18:00:34.748" v="70" actId="26606"/>
-          <ac:spMkLst>
-            <pc:docMk/>
-            <pc:sldMk cId="1796714290" sldId="264"/>
-            <ac:spMk id="31" creationId="{8B9AA7C6-5E5A-498E-A6DF-A943376E09BC}"/>
-          </ac:spMkLst>
-        </pc:spChg>
-        <pc:spChg chg="add del">
-          <ac:chgData name="CACERES CASTRO XIMENA LIZETH" userId="f563d6b3-b530-416d-a121-a47ff68979ea" providerId="ADAL" clId="{1F03FFFF-2808-4650-8B6F-6016474D36FF}" dt="2022-03-02T18:00:34.748" v="70" actId="26606"/>
-          <ac:spMkLst>
-            <pc:docMk/>
-            <pc:sldMk cId="1796714290" sldId="264"/>
-            <ac:spMk id="37" creationId="{81E140AE-0ABF-47C8-BF32-7D2F0CF2BA44}"/>
-          </ac:spMkLst>
-        </pc:spChg>
-        <pc:spChg chg="add del">
-          <ac:chgData name="CACERES CASTRO XIMENA LIZETH" userId="f563d6b3-b530-416d-a121-a47ff68979ea" providerId="ADAL" clId="{1F03FFFF-2808-4650-8B6F-6016474D36FF}" dt="2022-03-02T18:04:22.565" v="151" actId="26606"/>
-          <ac:spMkLst>
-            <pc:docMk/>
-            <pc:sldMk cId="1796714290" sldId="264"/>
-            <ac:spMk id="38" creationId="{3C48EA58-53D6-4E4A-9BDB-087D34617836}"/>
-          </ac:spMkLst>
-        </pc:spChg>
-        <pc:spChg chg="add del">
-          <ac:chgData name="CACERES CASTRO XIMENA LIZETH" userId="f563d6b3-b530-416d-a121-a47ff68979ea" providerId="ADAL" clId="{1F03FFFF-2808-4650-8B6F-6016474D36FF}" dt="2022-03-02T18:00:34.748" v="70" actId="26606"/>
-          <ac:spMkLst>
-            <pc:docMk/>
-            <pc:sldMk cId="1796714290" sldId="264"/>
-            <ac:spMk id="39" creationId="{CBC4F608-B4B8-48C3-9572-C0F061B1CD99}"/>
-          </ac:spMkLst>
-        </pc:spChg>
-        <pc:spChg chg="add del">
-          <ac:chgData name="CACERES CASTRO XIMENA LIZETH" userId="f563d6b3-b530-416d-a121-a47ff68979ea" providerId="ADAL" clId="{1F03FFFF-2808-4650-8B6F-6016474D36FF}" dt="2022-03-02T18:04:22.565" v="151" actId="26606"/>
-          <ac:spMkLst>
-            <pc:docMk/>
-            <pc:sldMk cId="1796714290" sldId="264"/>
-            <ac:spMk id="41" creationId="{C4B24C7E-2D5E-4C4E-9CD5-D61F243C9D1B}"/>
-          </ac:spMkLst>
-        </pc:spChg>
-        <pc:spChg chg="add">
-          <ac:chgData name="CACERES CASTRO XIMENA LIZETH" userId="f563d6b3-b530-416d-a121-a47ff68979ea" providerId="ADAL" clId="{1F03FFFF-2808-4650-8B6F-6016474D36FF}" dt="2022-03-02T18:04:22.565" v="151" actId="26606"/>
-          <ac:spMkLst>
-            <pc:docMk/>
-            <pc:sldMk cId="1796714290" sldId="264"/>
-            <ac:spMk id="45" creationId="{B6CDA21F-E7AF-4C75-8395-33F58D5B0E45}"/>
-          </ac:spMkLst>
-        </pc:spChg>
-        <pc:spChg chg="add">
-          <ac:chgData name="CACERES CASTRO XIMENA LIZETH" userId="f563d6b3-b530-416d-a121-a47ff68979ea" providerId="ADAL" clId="{1F03FFFF-2808-4650-8B6F-6016474D36FF}" dt="2022-03-02T18:04:22.565" v="151" actId="26606"/>
-          <ac:spMkLst>
-            <pc:docMk/>
-            <pc:sldMk cId="1796714290" sldId="264"/>
-            <ac:spMk id="47" creationId="{D5B0017B-2ECA-49AF-B397-DC140825DF8D}"/>
-          </ac:spMkLst>
-        </pc:spChg>
-        <pc:spChg chg="add del">
-          <ac:chgData name="CACERES CASTRO XIMENA LIZETH" userId="f563d6b3-b530-416d-a121-a47ff68979ea" providerId="ADAL" clId="{1F03FFFF-2808-4650-8B6F-6016474D36FF}" dt="2022-03-02T18:02:23.996" v="94" actId="26606"/>
-          <ac:spMkLst>
-            <pc:docMk/>
-            <pc:sldMk cId="1796714290" sldId="264"/>
-            <ac:spMk id="48" creationId="{8E2CC403-21CD-41DF-BAC4-329D7FF03C5C}"/>
-          </ac:spMkLst>
-        </pc:spChg>
-        <pc:spChg chg="add del">
-          <ac:chgData name="CACERES CASTRO XIMENA LIZETH" userId="f563d6b3-b530-416d-a121-a47ff68979ea" providerId="ADAL" clId="{1F03FFFF-2808-4650-8B6F-6016474D36FF}" dt="2022-03-02T18:02:33.084" v="96" actId="26606"/>
-          <ac:spMkLst>
-            <pc:docMk/>
-            <pc:sldMk cId="1796714290" sldId="264"/>
-            <ac:spMk id="54" creationId="{871AEA07-1E14-44B4-8E55-64EF049CD66F}"/>
-          </ac:spMkLst>
-        </pc:spChg>
-        <pc:spChg chg="add del">
-          <ac:chgData name="CACERES CASTRO XIMENA LIZETH" userId="f563d6b3-b530-416d-a121-a47ff68979ea" providerId="ADAL" clId="{1F03FFFF-2808-4650-8B6F-6016474D36FF}" dt="2022-03-02T18:02:23.996" v="94" actId="26606"/>
-          <ac:spMkLst>
-            <pc:docMk/>
-            <pc:sldMk cId="1796714290" sldId="264"/>
-            <ac:spMk id="55" creationId="{7653717E-6F8C-43E0-9893-C03AE87D18D6}"/>
-          </ac:spMkLst>
-        </pc:spChg>
-        <pc:spChg chg="add del">
-          <ac:chgData name="CACERES CASTRO XIMENA LIZETH" userId="f563d6b3-b530-416d-a121-a47ff68979ea" providerId="ADAL" clId="{1F03FFFF-2808-4650-8B6F-6016474D36FF}" dt="2022-03-02T18:02:37.098" v="98" actId="26606"/>
-          <ac:spMkLst>
-            <pc:docMk/>
-            <pc:sldMk cId="1796714290" sldId="264"/>
-            <ac:spMk id="56" creationId="{CBC4F608-B4B8-48C3-9572-C0F061B1CD99}"/>
-          </ac:spMkLst>
-        </pc:spChg>
-        <pc:spChg chg="add del">
-          <ac:chgData name="CACERES CASTRO XIMENA LIZETH" userId="f563d6b3-b530-416d-a121-a47ff68979ea" providerId="ADAL" clId="{1F03FFFF-2808-4650-8B6F-6016474D36FF}" dt="2022-03-02T18:02:23.996" v="94" actId="26606"/>
-          <ac:spMkLst>
-            <pc:docMk/>
-            <pc:sldMk cId="1796714290" sldId="264"/>
-            <ac:spMk id="57" creationId="{35BB14B4-EC3F-47C7-9AF3-B0E017B75C42}"/>
-          </ac:spMkLst>
-        </pc:spChg>
-        <pc:spChg chg="add del">
-          <ac:chgData name="CACERES CASTRO XIMENA LIZETH" userId="f563d6b3-b530-416d-a121-a47ff68979ea" providerId="ADAL" clId="{1F03FFFF-2808-4650-8B6F-6016474D36FF}" dt="2022-03-02T18:02:33.084" v="96" actId="26606"/>
-          <ac:spMkLst>
-            <pc:docMk/>
-            <pc:sldMk cId="1796714290" sldId="264"/>
-            <ac:spMk id="59" creationId="{9095C1F4-AE7F-44E4-8693-40D3D6831140}"/>
-          </ac:spMkLst>
-        </pc:spChg>
-        <pc:spChg chg="add del">
-          <ac:chgData name="CACERES CASTRO XIMENA LIZETH" userId="f563d6b3-b530-416d-a121-a47ff68979ea" providerId="ADAL" clId="{1F03FFFF-2808-4650-8B6F-6016474D36FF}" dt="2022-03-02T18:02:37.098" v="98" actId="26606"/>
-          <ac:spMkLst>
-            <pc:docMk/>
-            <pc:sldMk cId="1796714290" sldId="264"/>
-            <ac:spMk id="64" creationId="{8B9AA7C6-5E5A-498E-A6DF-A943376E09BC}"/>
-          </ac:spMkLst>
-        </pc:spChg>
-        <pc:spChg chg="add del">
-          <ac:chgData name="CACERES CASTRO XIMENA LIZETH" userId="f563d6b3-b530-416d-a121-a47ff68979ea" providerId="ADAL" clId="{1F03FFFF-2808-4650-8B6F-6016474D36FF}" dt="2022-03-02T18:02:37.098" v="98" actId="26606"/>
-          <ac:spMkLst>
-            <pc:docMk/>
-            <pc:sldMk cId="1796714290" sldId="264"/>
-            <ac:spMk id="66" creationId="{81E140AE-0ABF-47C8-BF32-7D2F0CF2BA44}"/>
-          </ac:spMkLst>
-        </pc:spChg>
-        <pc:spChg chg="add del">
-          <ac:chgData name="CACERES CASTRO XIMENA LIZETH" userId="f563d6b3-b530-416d-a121-a47ff68979ea" providerId="ADAL" clId="{1F03FFFF-2808-4650-8B6F-6016474D36FF}" dt="2022-03-02T18:02:38.823" v="100" actId="26606"/>
-          <ac:spMkLst>
-            <pc:docMk/>
-            <pc:sldMk cId="1796714290" sldId="264"/>
-            <ac:spMk id="68" creationId="{8E2CC403-21CD-41DF-BAC4-329D7FF03C5C}"/>
-          </ac:spMkLst>
-        </pc:spChg>
-        <pc:spChg chg="add del">
-          <ac:chgData name="CACERES CASTRO XIMENA LIZETH" userId="f563d6b3-b530-416d-a121-a47ff68979ea" providerId="ADAL" clId="{1F03FFFF-2808-4650-8B6F-6016474D36FF}" dt="2022-03-02T18:02:38.823" v="100" actId="26606"/>
-          <ac:spMkLst>
-            <pc:docMk/>
-            <pc:sldMk cId="1796714290" sldId="264"/>
-            <ac:spMk id="71" creationId="{7653717E-6F8C-43E0-9893-C03AE87D18D6}"/>
-          </ac:spMkLst>
-        </pc:spChg>
-        <pc:spChg chg="add del">
-          <ac:chgData name="CACERES CASTRO XIMENA LIZETH" userId="f563d6b3-b530-416d-a121-a47ff68979ea" providerId="ADAL" clId="{1F03FFFF-2808-4650-8B6F-6016474D36FF}" dt="2022-03-02T18:02:38.823" v="100" actId="26606"/>
-          <ac:spMkLst>
-            <pc:docMk/>
-            <pc:sldMk cId="1796714290" sldId="264"/>
-            <ac:spMk id="72" creationId="{35BB14B4-EC3F-47C7-9AF3-B0E017B75C42}"/>
-          </ac:spMkLst>
-        </pc:spChg>
-        <pc:spChg chg="add del">
-          <ac:chgData name="CACERES CASTRO XIMENA LIZETH" userId="f563d6b3-b530-416d-a121-a47ff68979ea" providerId="ADAL" clId="{1F03FFFF-2808-4650-8B6F-6016474D36FF}" dt="2022-03-02T18:02:51.333" v="102" actId="26606"/>
-          <ac:spMkLst>
-            <pc:docMk/>
-            <pc:sldMk cId="1796714290" sldId="264"/>
-            <ac:spMk id="74" creationId="{8B9AA7C6-5E5A-498E-A6DF-A943376E09BC}"/>
-          </ac:spMkLst>
-        </pc:spChg>
-        <pc:spChg chg="add del">
-          <ac:chgData name="CACERES CASTRO XIMENA LIZETH" userId="f563d6b3-b530-416d-a121-a47ff68979ea" providerId="ADAL" clId="{1F03FFFF-2808-4650-8B6F-6016474D36FF}" dt="2022-03-02T18:02:51.333" v="102" actId="26606"/>
-          <ac:spMkLst>
-            <pc:docMk/>
-            <pc:sldMk cId="1796714290" sldId="264"/>
-            <ac:spMk id="77" creationId="{81E140AE-0ABF-47C8-BF32-7D2F0CF2BA44}"/>
-          </ac:spMkLst>
-        </pc:spChg>
-        <pc:spChg chg="add del">
-          <ac:chgData name="CACERES CASTRO XIMENA LIZETH" userId="f563d6b3-b530-416d-a121-a47ff68979ea" providerId="ADAL" clId="{1F03FFFF-2808-4650-8B6F-6016474D36FF}" dt="2022-03-02T18:02:51.333" v="102" actId="26606"/>
-          <ac:spMkLst>
-            <pc:docMk/>
-            <pc:sldMk cId="1796714290" sldId="264"/>
-            <ac:spMk id="78" creationId="{CBC4F608-B4B8-48C3-9572-C0F061B1CD99}"/>
-          </ac:spMkLst>
-        </pc:spChg>
-        <pc:spChg chg="add del">
-          <ac:chgData name="CACERES CASTRO XIMENA LIZETH" userId="f563d6b3-b530-416d-a121-a47ff68979ea" providerId="ADAL" clId="{1F03FFFF-2808-4650-8B6F-6016474D36FF}" dt="2022-03-02T18:03:01.171" v="104" actId="26606"/>
-          <ac:spMkLst>
-            <pc:docMk/>
-            <pc:sldMk cId="1796714290" sldId="264"/>
-            <ac:spMk id="80" creationId="{8E2CC403-21CD-41DF-BAC4-329D7FF03C5C}"/>
-          </ac:spMkLst>
-        </pc:spChg>
-        <pc:spChg chg="add del">
-          <ac:chgData name="CACERES CASTRO XIMENA LIZETH" userId="f563d6b3-b530-416d-a121-a47ff68979ea" providerId="ADAL" clId="{1F03FFFF-2808-4650-8B6F-6016474D36FF}" dt="2022-03-02T18:03:01.171" v="104" actId="26606"/>
-          <ac:spMkLst>
-            <pc:docMk/>
-            <pc:sldMk cId="1796714290" sldId="264"/>
-            <ac:spMk id="83" creationId="{7653717E-6F8C-43E0-9893-C03AE87D18D6}"/>
-          </ac:spMkLst>
-        </pc:spChg>
-        <pc:spChg chg="add del">
-          <ac:chgData name="CACERES CASTRO XIMENA LIZETH" userId="f563d6b3-b530-416d-a121-a47ff68979ea" providerId="ADAL" clId="{1F03FFFF-2808-4650-8B6F-6016474D36FF}" dt="2022-03-02T18:03:01.171" v="104" actId="26606"/>
-          <ac:spMkLst>
-            <pc:docMk/>
-            <pc:sldMk cId="1796714290" sldId="264"/>
-            <ac:spMk id="84" creationId="{35BB14B4-EC3F-47C7-9AF3-B0E017B75C42}"/>
-          </ac:spMkLst>
-        </pc:spChg>
-        <pc:spChg chg="add del">
-          <ac:chgData name="CACERES CASTRO XIMENA LIZETH" userId="f563d6b3-b530-416d-a121-a47ff68979ea" providerId="ADAL" clId="{1F03FFFF-2808-4650-8B6F-6016474D36FF}" dt="2022-03-02T18:03:39.292" v="138" actId="26606"/>
-          <ac:spMkLst>
-            <pc:docMk/>
-            <pc:sldMk cId="1796714290" sldId="264"/>
-            <ac:spMk id="86" creationId="{A7895A40-19A4-42D6-9D30-DBC1E8002635}"/>
-          </ac:spMkLst>
-        </pc:spChg>
-        <pc:spChg chg="add del">
-          <ac:chgData name="CACERES CASTRO XIMENA LIZETH" userId="f563d6b3-b530-416d-a121-a47ff68979ea" providerId="ADAL" clId="{1F03FFFF-2808-4650-8B6F-6016474D36FF}" dt="2022-03-02T18:03:39.292" v="138" actId="26606"/>
-          <ac:spMkLst>
-            <pc:docMk/>
-            <pc:sldMk cId="1796714290" sldId="264"/>
-            <ac:spMk id="87" creationId="{02F429C4-ABC9-46FC-818A-B5429CDE4A96}"/>
-          </ac:spMkLst>
-        </pc:spChg>
-        <pc:spChg chg="add del">
-          <ac:chgData name="CACERES CASTRO XIMENA LIZETH" userId="f563d6b3-b530-416d-a121-a47ff68979ea" providerId="ADAL" clId="{1F03FFFF-2808-4650-8B6F-6016474D36FF}" dt="2022-03-02T18:03:39.292" v="138" actId="26606"/>
-          <ac:spMkLst>
-            <pc:docMk/>
-            <pc:sldMk cId="1796714290" sldId="264"/>
-            <ac:spMk id="88" creationId="{2CEF98E4-3709-4952-8F42-2305CCE34FA3}"/>
-          </ac:spMkLst>
-        </pc:spChg>
-        <pc:spChg chg="add del">
-          <ac:chgData name="CACERES CASTRO XIMENA LIZETH" userId="f563d6b3-b530-416d-a121-a47ff68979ea" providerId="ADAL" clId="{1F03FFFF-2808-4650-8B6F-6016474D36FF}" dt="2022-03-02T18:03:39.292" v="138" actId="26606"/>
-          <ac:spMkLst>
-            <pc:docMk/>
-            <pc:sldMk cId="1796714290" sldId="264"/>
-            <ac:spMk id="89" creationId="{F10BCCF5-D685-47FF-B675-647EAEB72C8E}"/>
-          </ac:spMkLst>
-        </pc:spChg>
-        <pc:spChg chg="add del">
-          <ac:chgData name="CACERES CASTRO XIMENA LIZETH" userId="f563d6b3-b530-416d-a121-a47ff68979ea" providerId="ADAL" clId="{1F03FFFF-2808-4650-8B6F-6016474D36FF}" dt="2022-03-02T18:03:39.292" v="138" actId="26606"/>
-          <ac:spMkLst>
-            <pc:docMk/>
-            <pc:sldMk cId="1796714290" sldId="264"/>
-            <ac:spMk id="90" creationId="{B0EE8A42-107A-4D4C-8D56-BBAE95C7FC0D}"/>
-          </ac:spMkLst>
-        </pc:spChg>
-        <pc:grpChg chg="add del">
-          <ac:chgData name="CACERES CASTRO XIMENA LIZETH" userId="f563d6b3-b530-416d-a121-a47ff68979ea" providerId="ADAL" clId="{1F03FFFF-2808-4650-8B6F-6016474D36FF}" dt="2022-03-02T18:00:34.763" v="71" actId="26606"/>
-          <ac:grpSpMkLst>
-            <pc:docMk/>
-            <pc:sldMk cId="1796714290" sldId="264"/>
-            <ac:grpSpMk id="19" creationId="{B13AA5FE-3FFC-4725-9ADD-E428544EC61B}"/>
-          </ac:grpSpMkLst>
-        </pc:grpChg>
-        <pc:grpChg chg="add del">
-          <ac:chgData name="CACERES CASTRO XIMENA LIZETH" userId="f563d6b3-b530-416d-a121-a47ff68979ea" providerId="ADAL" clId="{1F03FFFF-2808-4650-8B6F-6016474D36FF}" dt="2022-03-02T18:00:34.748" v="70" actId="26606"/>
-          <ac:grpSpMkLst>
-            <pc:docMk/>
-            <pc:sldMk cId="1796714290" sldId="264"/>
-            <ac:grpSpMk id="33" creationId="{83EAB11A-76F7-48F4-9B4F-5BFDF4BF9670}"/>
-          </ac:grpSpMkLst>
-        </pc:grpChg>
-        <pc:grpChg chg="add del">
-          <ac:chgData name="CACERES CASTRO XIMENA LIZETH" userId="f563d6b3-b530-416d-a121-a47ff68979ea" providerId="ADAL" clId="{1F03FFFF-2808-4650-8B6F-6016474D36FF}" dt="2022-03-02T18:04:22.565" v="151" actId="26606"/>
-          <ac:grpSpMkLst>
-            <pc:docMk/>
-            <pc:sldMk cId="1796714290" sldId="264"/>
-            <ac:grpSpMk id="42" creationId="{99072643-A0EC-42FB-B66A-24C0E6FFDC96}"/>
-          </ac:grpSpMkLst>
-        </pc:grpChg>
-        <pc:grpChg chg="add">
-          <ac:chgData name="CACERES CASTRO XIMENA LIZETH" userId="f563d6b3-b530-416d-a121-a47ff68979ea" providerId="ADAL" clId="{1F03FFFF-2808-4650-8B6F-6016474D36FF}" dt="2022-03-02T18:04:22.565" v="151" actId="26606"/>
-          <ac:grpSpMkLst>
-            <pc:docMk/>
-            <pc:sldMk cId="1796714290" sldId="264"/>
-            <ac:grpSpMk id="46" creationId="{AE1C45F0-260A-458C-96ED-C1F6D2151219}"/>
-          </ac:grpSpMkLst>
-        </pc:grpChg>
-        <pc:grpChg chg="add del">
-          <ac:chgData name="CACERES CASTRO XIMENA LIZETH" userId="f563d6b3-b530-416d-a121-a47ff68979ea" providerId="ADAL" clId="{1F03FFFF-2808-4650-8B6F-6016474D36FF}" dt="2022-03-02T18:02:23.996" v="94" actId="26606"/>
-          <ac:grpSpMkLst>
-            <pc:docMk/>
-            <pc:sldMk cId="1796714290" sldId="264"/>
-            <ac:grpSpMk id="50" creationId="{B13AA5FE-3FFC-4725-9ADD-E428544EC61B}"/>
-          </ac:grpSpMkLst>
-        </pc:grpChg>
-        <pc:grpChg chg="add del">
-          <ac:chgData name="CACERES CASTRO XIMENA LIZETH" userId="f563d6b3-b530-416d-a121-a47ff68979ea" providerId="ADAL" clId="{1F03FFFF-2808-4650-8B6F-6016474D36FF}" dt="2022-03-02T18:02:33.084" v="96" actId="26606"/>
-          <ac:grpSpMkLst>
-            <pc:docMk/>
-            <pc:sldMk cId="1796714290" sldId="264"/>
-            <ac:grpSpMk id="60" creationId="{8734DDD3-F723-4DD3-8ABE-EC0B2AC87D74}"/>
-          </ac:grpSpMkLst>
-        </pc:grpChg>
-        <pc:grpChg chg="add del">
-          <ac:chgData name="CACERES CASTRO XIMENA LIZETH" userId="f563d6b3-b530-416d-a121-a47ff68979ea" providerId="ADAL" clId="{1F03FFFF-2808-4650-8B6F-6016474D36FF}" dt="2022-03-02T18:02:37.098" v="98" actId="26606"/>
-          <ac:grpSpMkLst>
-            <pc:docMk/>
-            <pc:sldMk cId="1796714290" sldId="264"/>
-            <ac:grpSpMk id="65" creationId="{83EAB11A-76F7-48F4-9B4F-5BFDF4BF9670}"/>
-          </ac:grpSpMkLst>
-        </pc:grpChg>
-        <pc:grpChg chg="add del">
-          <ac:chgData name="CACERES CASTRO XIMENA LIZETH" userId="f563d6b3-b530-416d-a121-a47ff68979ea" providerId="ADAL" clId="{1F03FFFF-2808-4650-8B6F-6016474D36FF}" dt="2022-03-02T18:02:38.823" v="100" actId="26606"/>
-          <ac:grpSpMkLst>
-            <pc:docMk/>
-            <pc:sldMk cId="1796714290" sldId="264"/>
-            <ac:grpSpMk id="69" creationId="{B13AA5FE-3FFC-4725-9ADD-E428544EC61B}"/>
-          </ac:grpSpMkLst>
-        </pc:grpChg>
-        <pc:grpChg chg="add del">
-          <ac:chgData name="CACERES CASTRO XIMENA LIZETH" userId="f563d6b3-b530-416d-a121-a47ff68979ea" providerId="ADAL" clId="{1F03FFFF-2808-4650-8B6F-6016474D36FF}" dt="2022-03-02T18:02:51.333" v="102" actId="26606"/>
-          <ac:grpSpMkLst>
-            <pc:docMk/>
-            <pc:sldMk cId="1796714290" sldId="264"/>
-            <ac:grpSpMk id="75" creationId="{83EAB11A-76F7-48F4-9B4F-5BFDF4BF9670}"/>
-          </ac:grpSpMkLst>
-        </pc:grpChg>
-        <pc:grpChg chg="add del">
-          <ac:chgData name="CACERES CASTRO XIMENA LIZETH" userId="f563d6b3-b530-416d-a121-a47ff68979ea" providerId="ADAL" clId="{1F03FFFF-2808-4650-8B6F-6016474D36FF}" dt="2022-03-02T18:03:01.171" v="104" actId="26606"/>
-          <ac:grpSpMkLst>
-            <pc:docMk/>
-            <pc:sldMk cId="1796714290" sldId="264"/>
-            <ac:grpSpMk id="81" creationId="{B13AA5FE-3FFC-4725-9ADD-E428544EC61B}"/>
-          </ac:grpSpMkLst>
-        </pc:grpChg>
-        <pc:cxnChg chg="add">
-          <ac:chgData name="CACERES CASTRO XIMENA LIZETH" userId="f563d6b3-b530-416d-a121-a47ff68979ea" providerId="ADAL" clId="{1F03FFFF-2808-4650-8B6F-6016474D36FF}" dt="2022-03-02T18:04:22.565" v="151" actId="26606"/>
-          <ac:cxnSpMkLst>
-            <pc:docMk/>
-            <pc:sldMk cId="1796714290" sldId="264"/>
-            <ac:cxnSpMk id="49" creationId="{6CF1BAF6-AD41-4082-B212-8A1F9A2E8779}"/>
-          </ac:cxnSpMkLst>
-        </pc:cxnChg>
-      </pc:sldChg>
-      <pc:sldChg chg="addSp modSp mod setBg">
-        <pc:chgData name="CACERES CASTRO XIMENA LIZETH" userId="f563d6b3-b530-416d-a121-a47ff68979ea" providerId="ADAL" clId="{1F03FFFF-2808-4650-8B6F-6016474D36FF}" dt="2022-03-02T17:57:01.161" v="44" actId="20577"/>
-        <pc:sldMkLst>
-          <pc:docMk/>
-          <pc:sldMk cId="2610895302" sldId="265"/>
-        </pc:sldMkLst>
-        <pc:spChg chg="mod">
-          <ac:chgData name="CACERES CASTRO XIMENA LIZETH" userId="f563d6b3-b530-416d-a121-a47ff68979ea" providerId="ADAL" clId="{1F03FFFF-2808-4650-8B6F-6016474D36FF}" dt="2022-03-02T17:56:19.008" v="42" actId="113"/>
-          <ac:spMkLst>
-            <pc:docMk/>
-            <pc:sldMk cId="2610895302" sldId="265"/>
-            <ac:spMk id="2" creationId="{FD45C9A1-C0FE-484E-A43E-DD798059A690}"/>
-          </ac:spMkLst>
-        </pc:spChg>
-        <pc:spChg chg="mod">
-          <ac:chgData name="CACERES CASTRO XIMENA LIZETH" userId="f563d6b3-b530-416d-a121-a47ff68979ea" providerId="ADAL" clId="{1F03FFFF-2808-4650-8B6F-6016474D36FF}" dt="2022-03-02T17:57:01.161" v="44" actId="20577"/>
-          <ac:spMkLst>
-            <pc:docMk/>
-            <pc:sldMk cId="2610895302" sldId="265"/>
-            <ac:spMk id="3" creationId="{AB04D9CD-5536-4DA9-8D3A-31F8F173D6E9}"/>
-          </ac:spMkLst>
-        </pc:spChg>
-        <pc:spChg chg="add">
-          <ac:chgData name="CACERES CASTRO XIMENA LIZETH" userId="f563d6b3-b530-416d-a121-a47ff68979ea" providerId="ADAL" clId="{1F03FFFF-2808-4650-8B6F-6016474D36FF}" dt="2022-03-02T17:56:02.716" v="40" actId="26606"/>
-          <ac:spMkLst>
-            <pc:docMk/>
-            <pc:sldMk cId="2610895302" sldId="265"/>
-            <ac:spMk id="8" creationId="{1BB867FF-FC45-48F7-8104-F89BE54909F1}"/>
-          </ac:spMkLst>
-        </pc:spChg>
-        <pc:spChg chg="add">
-          <ac:chgData name="CACERES CASTRO XIMENA LIZETH" userId="f563d6b3-b530-416d-a121-a47ff68979ea" providerId="ADAL" clId="{1F03FFFF-2808-4650-8B6F-6016474D36FF}" dt="2022-03-02T17:56:02.716" v="40" actId="26606"/>
-          <ac:spMkLst>
-            <pc:docMk/>
-            <pc:sldMk cId="2610895302" sldId="265"/>
-            <ac:spMk id="10" creationId="{8BB56887-D0D5-4F0C-9E19-7247EB83C8B7}"/>
-          </ac:spMkLst>
-        </pc:spChg>
-        <pc:spChg chg="add">
-          <ac:chgData name="CACERES CASTRO XIMENA LIZETH" userId="f563d6b3-b530-416d-a121-a47ff68979ea" providerId="ADAL" clId="{1F03FFFF-2808-4650-8B6F-6016474D36FF}" dt="2022-03-02T17:56:02.716" v="40" actId="26606"/>
-          <ac:spMkLst>
-            <pc:docMk/>
-            <pc:sldMk cId="2610895302" sldId="265"/>
-            <ac:spMk id="12" creationId="{081E4A58-353D-44AE-B2FC-2A74E2E400F7}"/>
-          </ac:spMkLst>
-        </pc:spChg>
-      </pc:sldChg>
-      <pc:sldChg chg="addSp delSp modSp new mod setBg addAnim delAnim">
-        <pc:chgData name="CACERES CASTRO XIMENA LIZETH" userId="f563d6b3-b530-416d-a121-a47ff68979ea" providerId="ADAL" clId="{1F03FFFF-2808-4650-8B6F-6016474D36FF}" dt="2022-03-02T18:06:10.877" v="161" actId="20577"/>
-        <pc:sldMkLst>
-          <pc:docMk/>
-          <pc:sldMk cId="3035593005" sldId="266"/>
-        </pc:sldMkLst>
-        <pc:spChg chg="mod">
-          <ac:chgData name="CACERES CASTRO XIMENA LIZETH" userId="f563d6b3-b530-416d-a121-a47ff68979ea" providerId="ADAL" clId="{1F03FFFF-2808-4650-8B6F-6016474D36FF}" dt="2022-03-02T18:06:10.877" v="161" actId="20577"/>
-          <ac:spMkLst>
-            <pc:docMk/>
-            <pc:sldMk cId="3035593005" sldId="266"/>
-            <ac:spMk id="2" creationId="{444F7C14-DC83-46E5-AF88-17FE83FAAA2C}"/>
-          </ac:spMkLst>
-        </pc:spChg>
-        <pc:spChg chg="del">
-          <ac:chgData name="CACERES CASTRO XIMENA LIZETH" userId="f563d6b3-b530-416d-a121-a47ff68979ea" providerId="ADAL" clId="{1F03FFFF-2808-4650-8B6F-6016474D36FF}" dt="2022-03-02T17:53:39.843" v="25"/>
-          <ac:spMkLst>
-            <pc:docMk/>
-            <pc:sldMk cId="3035593005" sldId="266"/>
-            <ac:spMk id="3" creationId="{90D62CAC-D9EF-460C-B914-66A3DC71622D}"/>
-          </ac:spMkLst>
-        </pc:spChg>
-        <pc:spChg chg="add del mod">
-          <ac:chgData name="CACERES CASTRO XIMENA LIZETH" userId="f563d6b3-b530-416d-a121-a47ff68979ea" providerId="ADAL" clId="{1F03FFFF-2808-4650-8B6F-6016474D36FF}" dt="2022-03-02T17:54:05.396" v="32" actId="478"/>
-          <ac:spMkLst>
-            <pc:docMk/>
-            <pc:sldMk cId="3035593005" sldId="266"/>
-            <ac:spMk id="7" creationId="{EF80BD98-4622-4FF0-A953-333853463A33}"/>
-          </ac:spMkLst>
-        </pc:spChg>
-        <pc:spChg chg="add del">
-          <ac:chgData name="CACERES CASTRO XIMENA LIZETH" userId="f563d6b3-b530-416d-a121-a47ff68979ea" providerId="ADAL" clId="{1F03FFFF-2808-4650-8B6F-6016474D36FF}" dt="2022-03-02T17:58:09.858" v="57" actId="26606"/>
-          <ac:spMkLst>
-            <pc:docMk/>
-            <pc:sldMk cId="3035593005" sldId="266"/>
-            <ac:spMk id="11" creationId="{BCED4D40-4B67-4331-AC48-79B82B4A47D8}"/>
-          </ac:spMkLst>
-        </pc:spChg>
-        <pc:spChg chg="add del">
-          <ac:chgData name="CACERES CASTRO XIMENA LIZETH" userId="f563d6b3-b530-416d-a121-a47ff68979ea" providerId="ADAL" clId="{1F03FFFF-2808-4650-8B6F-6016474D36FF}" dt="2022-03-02T17:58:09.858" v="57" actId="26606"/>
-          <ac:spMkLst>
-            <pc:docMk/>
-            <pc:sldMk cId="3035593005" sldId="266"/>
-            <ac:spMk id="12" creationId="{670CEDEF-4F34-412E-84EE-329C1E936AF5}"/>
-          </ac:spMkLst>
-        </pc:spChg>
-        <pc:spChg chg="add del">
-          <ac:chgData name="CACERES CASTRO XIMENA LIZETH" userId="f563d6b3-b530-416d-a121-a47ff68979ea" providerId="ADAL" clId="{1F03FFFF-2808-4650-8B6F-6016474D36FF}" dt="2022-03-02T17:57:41.873" v="46" actId="26606"/>
-          <ac:spMkLst>
-            <pc:docMk/>
-            <pc:sldMk cId="3035593005" sldId="266"/>
-            <ac:spMk id="14" creationId="{BCED4D40-4B67-4331-AC48-79B82B4A47D8}"/>
-          </ac:spMkLst>
-        </pc:spChg>
-        <pc:spChg chg="add del">
-          <ac:chgData name="CACERES CASTRO XIMENA LIZETH" userId="f563d6b3-b530-416d-a121-a47ff68979ea" providerId="ADAL" clId="{1F03FFFF-2808-4650-8B6F-6016474D36FF}" dt="2022-03-02T17:58:09.858" v="57" actId="26606"/>
-          <ac:spMkLst>
-            <pc:docMk/>
-            <pc:sldMk cId="3035593005" sldId="266"/>
-            <ac:spMk id="15" creationId="{C1DD1A8A-57D5-4A81-AD04-532B043C5611}"/>
-          </ac:spMkLst>
-        </pc:spChg>
-        <pc:spChg chg="add del">
-          <ac:chgData name="CACERES CASTRO XIMENA LIZETH" userId="f563d6b3-b530-416d-a121-a47ff68979ea" providerId="ADAL" clId="{1F03FFFF-2808-4650-8B6F-6016474D36FF}" dt="2022-03-02T17:57:41.873" v="46" actId="26606"/>
-          <ac:spMkLst>
-            <pc:docMk/>
-            <pc:sldMk cId="3035593005" sldId="266"/>
-            <ac:spMk id="16" creationId="{670CEDEF-4F34-412E-84EE-329C1E936AF5}"/>
-          </ac:spMkLst>
-        </pc:spChg>
-        <pc:spChg chg="add del">
-          <ac:chgData name="CACERES CASTRO XIMENA LIZETH" userId="f563d6b3-b530-416d-a121-a47ff68979ea" providerId="ADAL" clId="{1F03FFFF-2808-4650-8B6F-6016474D36FF}" dt="2022-03-02T17:57:43.558" v="48" actId="26606"/>
-          <ac:spMkLst>
-            <pc:docMk/>
-            <pc:sldMk cId="3035593005" sldId="266"/>
-            <ac:spMk id="18" creationId="{C59AB4C8-9178-4F7A-8404-6890510B5917}"/>
-          </ac:spMkLst>
-        </pc:spChg>
-        <pc:spChg chg="add del">
-          <ac:chgData name="CACERES CASTRO XIMENA LIZETH" userId="f563d6b3-b530-416d-a121-a47ff68979ea" providerId="ADAL" clId="{1F03FFFF-2808-4650-8B6F-6016474D36FF}" dt="2022-03-02T17:57:43.558" v="48" actId="26606"/>
-          <ac:spMkLst>
-            <pc:docMk/>
-            <pc:sldMk cId="3035593005" sldId="266"/>
-            <ac:spMk id="19" creationId="{4CFDFB37-4BC7-42C6-915D-A6609139BFE7}"/>
-          </ac:spMkLst>
-        </pc:spChg>
-        <pc:spChg chg="add del">
-          <ac:chgData name="CACERES CASTRO XIMENA LIZETH" userId="f563d6b3-b530-416d-a121-a47ff68979ea" providerId="ADAL" clId="{1F03FFFF-2808-4650-8B6F-6016474D36FF}" dt="2022-03-02T17:58:09.858" v="57" actId="26606"/>
-          <ac:spMkLst>
-            <pc:docMk/>
-            <pc:sldMk cId="3035593005" sldId="266"/>
-            <ac:spMk id="20" creationId="{007891EC-4501-44ED-A8C8-B11B6DB767AB}"/>
-          </ac:spMkLst>
-        </pc:spChg>
-        <pc:spChg chg="add del">
-          <ac:chgData name="CACERES CASTRO XIMENA LIZETH" userId="f563d6b3-b530-416d-a121-a47ff68979ea" providerId="ADAL" clId="{1F03FFFF-2808-4650-8B6F-6016474D36FF}" dt="2022-03-02T17:57:52.446" v="52" actId="26606"/>
-          <ac:spMkLst>
-            <pc:docMk/>
-            <pc:sldMk cId="3035593005" sldId="266"/>
-            <ac:spMk id="21" creationId="{BCED4D40-4B67-4331-AC48-79B82B4A47D8}"/>
-          </ac:spMkLst>
-        </pc:spChg>
-        <pc:spChg chg="add del">
-          <ac:chgData name="CACERES CASTRO XIMENA LIZETH" userId="f563d6b3-b530-416d-a121-a47ff68979ea" providerId="ADAL" clId="{1F03FFFF-2808-4650-8B6F-6016474D36FF}" dt="2022-03-02T17:57:52.446" v="52" actId="26606"/>
-          <ac:spMkLst>
-            <pc:docMk/>
-            <pc:sldMk cId="3035593005" sldId="266"/>
-            <ac:spMk id="22" creationId="{670CEDEF-4F34-412E-84EE-329C1E936AF5}"/>
-          </ac:spMkLst>
-        </pc:spChg>
-        <pc:picChg chg="add del mod">
-          <ac:chgData name="CACERES CASTRO XIMENA LIZETH" userId="f563d6b3-b530-416d-a121-a47ff68979ea" providerId="ADAL" clId="{1F03FFFF-2808-4650-8B6F-6016474D36FF}" dt="2022-03-02T17:53:57.802" v="31" actId="478"/>
-          <ac:picMkLst>
-            <pc:docMk/>
-            <pc:sldMk cId="3035593005" sldId="266"/>
-            <ac:picMk id="5" creationId="{892934FE-CF2A-4390-BE77-667E74ABDE4C}"/>
-          </ac:picMkLst>
-        </pc:picChg>
-        <pc:picChg chg="add del mod">
-          <ac:chgData name="CACERES CASTRO XIMENA LIZETH" userId="f563d6b3-b530-416d-a121-a47ff68979ea" providerId="ADAL" clId="{1F03FFFF-2808-4650-8B6F-6016474D36FF}" dt="2022-03-02T17:58:01.946" v="54" actId="478"/>
-          <ac:picMkLst>
-            <pc:docMk/>
-            <pc:sldMk cId="3035593005" sldId="266"/>
-            <ac:picMk id="9" creationId="{E51270D4-4B09-456E-A81C-0AE91AC49D13}"/>
-          </ac:picMkLst>
-        </pc:picChg>
-        <pc:picChg chg="add mod">
-          <ac:chgData name="CACERES CASTRO XIMENA LIZETH" userId="f563d6b3-b530-416d-a121-a47ff68979ea" providerId="ADAL" clId="{1F03FFFF-2808-4650-8B6F-6016474D36FF}" dt="2022-03-02T17:58:51.498" v="67" actId="14100"/>
-          <ac:picMkLst>
-            <pc:docMk/>
-            <pc:sldMk cId="3035593005" sldId="266"/>
-            <ac:picMk id="13" creationId="{F053B2A1-8E00-47DF-83C5-145B324C1411}"/>
-          </ac:picMkLst>
-        </pc:picChg>
-        <pc:picChg chg="add del">
-          <ac:chgData name="CACERES CASTRO XIMENA LIZETH" userId="f563d6b3-b530-416d-a121-a47ff68979ea" providerId="ADAL" clId="{1F03FFFF-2808-4650-8B6F-6016474D36FF}" dt="2022-03-02T17:58:09.858" v="57" actId="26606"/>
-          <ac:picMkLst>
-            <pc:docMk/>
-            <pc:sldMk cId="3035593005" sldId="266"/>
-            <ac:picMk id="17" creationId="{1EE138C5-94B5-4340-A108-97AEC6E7A60D}"/>
-          </ac:picMkLst>
-        </pc:picChg>
-      </pc:sldChg>
-      <pc:sldChg chg="addSp delSp modSp mod">
-        <pc:chgData name="CACERES CASTRO XIMENA LIZETH" userId="f563d6b3-b530-416d-a121-a47ff68979ea" providerId="ADAL" clId="{1F03FFFF-2808-4650-8B6F-6016474D36FF}" dt="2022-03-10T03:53:25.513" v="244" actId="14100"/>
-        <pc:sldMkLst>
-          <pc:docMk/>
-          <pc:sldMk cId="1904506013" sldId="269"/>
-        </pc:sldMkLst>
-        <pc:spChg chg="add del mod">
-          <ac:chgData name="CACERES CASTRO XIMENA LIZETH" userId="f563d6b3-b530-416d-a121-a47ff68979ea" providerId="ADAL" clId="{1F03FFFF-2808-4650-8B6F-6016474D36FF}" dt="2022-03-10T03:51:58.470" v="188"/>
-          <ac:spMkLst>
-            <pc:docMk/>
-            <pc:sldMk cId="1904506013" sldId="269"/>
-            <ac:spMk id="5" creationId="{9BE342B4-F51A-42C9-A8E5-E41878427ED9}"/>
-          </ac:spMkLst>
-        </pc:spChg>
-        <pc:spChg chg="add mod">
-          <ac:chgData name="CACERES CASTRO XIMENA LIZETH" userId="f563d6b3-b530-416d-a121-a47ff68979ea" providerId="ADAL" clId="{1F03FFFF-2808-4650-8B6F-6016474D36FF}" dt="2022-03-10T03:53:11.201" v="241" actId="26606"/>
-          <ac:spMkLst>
-            <pc:docMk/>
-            <pc:sldMk cId="1904506013" sldId="269"/>
-            <ac:spMk id="6" creationId="{BF299DA2-19BF-405F-846B-2398F3625782}"/>
-          </ac:spMkLst>
-        </pc:spChg>
-        <pc:picChg chg="del mod">
-          <ac:chgData name="CACERES CASTRO XIMENA LIZETH" userId="f563d6b3-b530-416d-a121-a47ff68979ea" providerId="ADAL" clId="{1F03FFFF-2808-4650-8B6F-6016474D36FF}" dt="2022-03-10T03:50:18.772" v="163" actId="478"/>
-          <ac:picMkLst>
-            <pc:docMk/>
-            <pc:sldMk cId="1904506013" sldId="269"/>
-            <ac:picMk id="2" creationId="{41B60D9D-F32C-4CB3-AB94-761938FF046D}"/>
-          </ac:picMkLst>
-        </pc:picChg>
-        <pc:picChg chg="add mod ord modCrop">
-          <ac:chgData name="CACERES CASTRO XIMENA LIZETH" userId="f563d6b3-b530-416d-a121-a47ff68979ea" providerId="ADAL" clId="{1F03FFFF-2808-4650-8B6F-6016474D36FF}" dt="2022-03-10T03:53:25.513" v="244" actId="14100"/>
-          <ac:picMkLst>
-            <pc:docMk/>
-            <pc:sldMk cId="1904506013" sldId="269"/>
-            <ac:picMk id="4" creationId="{4CA6DE21-E58C-4889-86FD-58975702BE38}"/>
-          </ac:picMkLst>
-        </pc:picChg>
-      </pc:sldChg>
-      <pc:sldChg chg="new del">
-        <pc:chgData name="CACERES CASTRO XIMENA LIZETH" userId="f563d6b3-b530-416d-a121-a47ff68979ea" providerId="ADAL" clId="{1F03FFFF-2808-4650-8B6F-6016474D36FF}" dt="2022-03-10T03:53:34.803" v="246" actId="680"/>
-        <pc:sldMkLst>
-          <pc:docMk/>
-          <pc:sldMk cId="2908027269" sldId="270"/>
-        </pc:sldMkLst>
-      </pc:sldChg>
-      <pc:sldChg chg="addSp delSp modSp new mod">
-        <pc:chgData name="CACERES CASTRO XIMENA LIZETH" userId="f563d6b3-b530-416d-a121-a47ff68979ea" providerId="ADAL" clId="{1F03FFFF-2808-4650-8B6F-6016474D36FF}" dt="2022-03-10T04:01:08.211" v="284" actId="962"/>
-        <pc:sldMkLst>
-          <pc:docMk/>
-          <pc:sldMk cId="4052382930" sldId="270"/>
-        </pc:sldMkLst>
-        <pc:spChg chg="add del mod">
-          <ac:chgData name="CACERES CASTRO XIMENA LIZETH" userId="f563d6b3-b530-416d-a121-a47ff68979ea" providerId="ADAL" clId="{1F03FFFF-2808-4650-8B6F-6016474D36FF}" dt="2022-03-10T03:58:32.507" v="266"/>
-          <ac:spMkLst>
-            <pc:docMk/>
-            <pc:sldMk cId="4052382930" sldId="270"/>
-            <ac:spMk id="4" creationId="{C937290C-6C35-4412-B167-6A9F438107C2}"/>
-          </ac:spMkLst>
-        </pc:spChg>
-        <pc:picChg chg="add del mod modCrop">
-          <ac:chgData name="CACERES CASTRO XIMENA LIZETH" userId="f563d6b3-b530-416d-a121-a47ff68979ea" providerId="ADAL" clId="{1F03FFFF-2808-4650-8B6F-6016474D36FF}" dt="2022-03-10T04:00:55.470" v="280" actId="478"/>
-          <ac:picMkLst>
-            <pc:docMk/>
-            <pc:sldMk cId="4052382930" sldId="270"/>
-            <ac:picMk id="3" creationId="{CAAF64BC-2ED4-4076-853A-F9A1BB3DF69F}"/>
-          </ac:picMkLst>
-        </pc:picChg>
-        <pc:picChg chg="add del mod modCrop">
-          <ac:chgData name="CACERES CASTRO XIMENA LIZETH" userId="f563d6b3-b530-416d-a121-a47ff68979ea" providerId="ADAL" clId="{1F03FFFF-2808-4650-8B6F-6016474D36FF}" dt="2022-03-10T04:00:57.009" v="281" actId="478"/>
-          <ac:picMkLst>
-            <pc:docMk/>
-            <pc:sldMk cId="4052382930" sldId="270"/>
-            <ac:picMk id="6" creationId="{F5906F91-4D0D-4386-A6FA-A96C718AB661}"/>
-          </ac:picMkLst>
-        </pc:picChg>
-        <pc:picChg chg="add mod">
-          <ac:chgData name="CACERES CASTRO XIMENA LIZETH" userId="f563d6b3-b530-416d-a121-a47ff68979ea" providerId="ADAL" clId="{1F03FFFF-2808-4650-8B6F-6016474D36FF}" dt="2022-03-10T04:01:08.211" v="284" actId="962"/>
-          <ac:picMkLst>
-            <pc:docMk/>
-            <pc:sldMk cId="4052382930" sldId="270"/>
-            <ac:picMk id="8" creationId="{B3094855-D0A6-44BB-AFCF-0B51D35E99E9}"/>
-          </ac:picMkLst>
-        </pc:picChg>
-      </pc:sldChg>
-      <pc:sldChg chg="addSp modSp new mod">
-        <pc:chgData name="CACERES CASTRO XIMENA LIZETH" userId="f563d6b3-b530-416d-a121-a47ff68979ea" providerId="ADAL" clId="{1F03FFFF-2808-4650-8B6F-6016474D36FF}" dt="2022-03-10T04:01:31.860" v="288" actId="962"/>
-        <pc:sldMkLst>
-          <pc:docMk/>
-          <pc:sldMk cId="690894088" sldId="271"/>
-        </pc:sldMkLst>
-        <pc:picChg chg="add mod">
-          <ac:chgData name="CACERES CASTRO XIMENA LIZETH" userId="f563d6b3-b530-416d-a121-a47ff68979ea" providerId="ADAL" clId="{1F03FFFF-2808-4650-8B6F-6016474D36FF}" dt="2022-03-10T04:01:31.860" v="288" actId="962"/>
-          <ac:picMkLst>
-            <pc:docMk/>
-            <pc:sldMk cId="690894088" sldId="271"/>
-            <ac:picMk id="3" creationId="{F98EBD38-C899-4116-BCFB-0781BCD6E900}"/>
+            <ac:picMk id="6" creationId="{3F20750A-6DFB-4AD2-9CE5-8617C2F4C147}"/>
           </ac:picMkLst>
         </pc:picChg>
       </pc:sldChg>
@@ -1268,6 +587,22 @@
             <ac:spMk id="3" creationId="{AB04D9CD-5536-4DA9-8D3A-31F8F173D6E9}"/>
           </ac:spMkLst>
         </pc:spChg>
+      </pc:sldChg>
+    </pc:docChg>
+  </pc:docChgLst>
+  <pc:docChgLst>
+    <pc:chgData name="Usuario invitado" userId="S::urn:spo:anon#641744186c5fce3e36a647224ab405501d2fc04b1dc5538135e19fe1c18a87a6::" providerId="AD" clId="Web-{1EA1F652-A610-43F8-84E3-091BB8B3A0F4}"/>
+    <pc:docChg chg="addSld">
+      <pc:chgData name="Usuario invitado" userId="S::urn:spo:anon#641744186c5fce3e36a647224ab405501d2fc04b1dc5538135e19fe1c18a87a6::" providerId="AD" clId="Web-{1EA1F652-A610-43F8-84E3-091BB8B3A0F4}" dt="2022-02-25T20:22:42.628" v="0"/>
+      <pc:docMkLst>
+        <pc:docMk/>
+      </pc:docMkLst>
+      <pc:sldChg chg="new">
+        <pc:chgData name="Usuario invitado" userId="S::urn:spo:anon#641744186c5fce3e36a647224ab405501d2fc04b1dc5538135e19fe1c18a87a6::" providerId="AD" clId="Web-{1EA1F652-A610-43F8-84E3-091BB8B3A0F4}" dt="2022-02-25T20:22:42.628" v="0"/>
+        <pc:sldMkLst>
+          <pc:docMk/>
+          <pc:sldMk cId="883538536" sldId="256"/>
+        </pc:sldMkLst>
       </pc:sldChg>
     </pc:docChg>
   </pc:docChgLst>
@@ -1325,24 +660,760 @@
     </pc:docChg>
   </pc:docChgLst>
   <pc:docChgLst>
-    <pc:chgData name="Usuario invitado" userId="S::urn:spo:anon#416cc96c5a3d7e9fc3bf7bce4ff7d30c927622a9fd6272cd08bafe94d85b1603::" providerId="AD" clId="Web-{30964437-2AAC-4A10-9742-A5F15A6E61AC}"/>
-    <pc:docChg chg="modSld">
-      <pc:chgData name="Usuario invitado" userId="S::urn:spo:anon#416cc96c5a3d7e9fc3bf7bce4ff7d30c927622a9fd6272cd08bafe94d85b1603::" providerId="AD" clId="Web-{30964437-2AAC-4A10-9742-A5F15A6E61AC}" dt="2022-03-10T14:49:33.683" v="0" actId="1076"/>
+    <pc:chgData name="Usuario invitado" userId="S::urn:spo:anon#641744186c5fce3e36a647224ab405501d2fc04b1dc5538135e19fe1c18a87a6::" providerId="AD" clId="Web-{578E51C3-6D16-4A4B-BEC4-1136DC97C28D}"/>
+    <pc:docChg chg="addSld modSld">
+      <pc:chgData name="Usuario invitado" userId="S::urn:spo:anon#641744186c5fce3e36a647224ab405501d2fc04b1dc5538135e19fe1c18a87a6::" providerId="AD" clId="Web-{578E51C3-6D16-4A4B-BEC4-1136DC97C28D}" dt="2022-02-27T22:30:46.508" v="37" actId="20577"/>
       <pc:docMkLst>
         <pc:docMk/>
       </pc:docMkLst>
-      <pc:sldChg chg="modSp">
-        <pc:chgData name="Usuario invitado" userId="S::urn:spo:anon#416cc96c5a3d7e9fc3bf7bce4ff7d30c927622a9fd6272cd08bafe94d85b1603::" providerId="AD" clId="Web-{30964437-2AAC-4A10-9742-A5F15A6E61AC}" dt="2022-03-10T14:49:33.683" v="0" actId="1076"/>
+      <pc:sldChg chg="modSp new">
+        <pc:chgData name="Usuario invitado" userId="S::urn:spo:anon#641744186c5fce3e36a647224ab405501d2fc04b1dc5538135e19fe1c18a87a6::" providerId="AD" clId="Web-{578E51C3-6D16-4A4B-BEC4-1136DC97C28D}" dt="2022-02-27T22:30:33.461" v="33" actId="20577"/>
+        <pc:sldMkLst>
+          <pc:docMk/>
+          <pc:sldMk cId="1796714290" sldId="264"/>
+        </pc:sldMkLst>
+        <pc:spChg chg="mod">
+          <ac:chgData name="Usuario invitado" userId="S::urn:spo:anon#641744186c5fce3e36a647224ab405501d2fc04b1dc5538135e19fe1c18a87a6::" providerId="AD" clId="Web-{578E51C3-6D16-4A4B-BEC4-1136DC97C28D}" dt="2022-02-27T22:12:01.317" v="13" actId="20577"/>
+          <ac:spMkLst>
+            <pc:docMk/>
+            <pc:sldMk cId="1796714290" sldId="264"/>
+            <ac:spMk id="2" creationId="{FD4557E2-C4D0-4E10-9F91-29113A7F0DA5}"/>
+          </ac:spMkLst>
+        </pc:spChg>
+        <pc:spChg chg="mod">
+          <ac:chgData name="Usuario invitado" userId="S::urn:spo:anon#641744186c5fce3e36a647224ab405501d2fc04b1dc5538135e19fe1c18a87a6::" providerId="AD" clId="Web-{578E51C3-6D16-4A4B-BEC4-1136DC97C28D}" dt="2022-02-27T22:30:33.461" v="33" actId="20577"/>
+          <ac:spMkLst>
+            <pc:docMk/>
+            <pc:sldMk cId="1796714290" sldId="264"/>
+            <ac:spMk id="3" creationId="{FBC0CC10-2E4D-4F58-9470-3AF9AB02377B}"/>
+          </ac:spMkLst>
+        </pc:spChg>
+      </pc:sldChg>
+      <pc:sldChg chg="modSp new">
+        <pc:chgData name="Usuario invitado" userId="S::urn:spo:anon#641744186c5fce3e36a647224ab405501d2fc04b1dc5538135e19fe1c18a87a6::" providerId="AD" clId="Web-{578E51C3-6D16-4A4B-BEC4-1136DC97C28D}" dt="2022-02-27T22:30:46.508" v="37" actId="20577"/>
+        <pc:sldMkLst>
+          <pc:docMk/>
+          <pc:sldMk cId="2610895302" sldId="265"/>
+        </pc:sldMkLst>
+        <pc:spChg chg="mod">
+          <ac:chgData name="Usuario invitado" userId="S::urn:spo:anon#641744186c5fce3e36a647224ab405501d2fc04b1dc5538135e19fe1c18a87a6::" providerId="AD" clId="Web-{578E51C3-6D16-4A4B-BEC4-1136DC97C28D}" dt="2022-02-27T22:12:33.349" v="31" actId="20577"/>
+          <ac:spMkLst>
+            <pc:docMk/>
+            <pc:sldMk cId="2610895302" sldId="265"/>
+            <ac:spMk id="2" creationId="{FD45C9A1-C0FE-484E-A43E-DD798059A690}"/>
+          </ac:spMkLst>
+        </pc:spChg>
+        <pc:spChg chg="mod">
+          <ac:chgData name="Usuario invitado" userId="S::urn:spo:anon#641744186c5fce3e36a647224ab405501d2fc04b1dc5538135e19fe1c18a87a6::" providerId="AD" clId="Web-{578E51C3-6D16-4A4B-BEC4-1136DC97C28D}" dt="2022-02-27T22:30:46.508" v="37" actId="20577"/>
+          <ac:spMkLst>
+            <pc:docMk/>
+            <pc:sldMk cId="2610895302" sldId="265"/>
+            <ac:spMk id="3" creationId="{AB04D9CD-5536-4DA9-8D3A-31F8F173D6E9}"/>
+          </ac:spMkLst>
+        </pc:spChg>
+      </pc:sldChg>
+    </pc:docChg>
+  </pc:docChgLst>
+  <pc:docChgLst>
+    <pc:chgData name="CACERES CASTRO XIMENA LIZETH" userId="f563d6b3-b530-416d-a121-a47ff68979ea" providerId="ADAL" clId="{1F03FFFF-2808-4650-8B6F-6016474D36FF}"/>
+    <pc:docChg chg="undo custSel addSld delSld modSld">
+      <pc:chgData name="CACERES CASTRO XIMENA LIZETH" userId="f563d6b3-b530-416d-a121-a47ff68979ea" providerId="ADAL" clId="{1F03FFFF-2808-4650-8B6F-6016474D36FF}" dt="2022-03-10T04:01:31.860" v="288" actId="962"/>
+      <pc:docMkLst>
+        <pc:docMk/>
+      </pc:docMkLst>
+      <pc:sldChg chg="modSp mod">
+        <pc:chgData name="CACERES CASTRO XIMENA LIZETH" userId="f563d6b3-b530-416d-a121-a47ff68979ea" providerId="ADAL" clId="{1F03FFFF-2808-4650-8B6F-6016474D36FF}" dt="2022-03-02T18:05:08.442" v="157" actId="113"/>
         <pc:sldMkLst>
           <pc:docMk/>
           <pc:sldMk cId="1324508986" sldId="257"/>
         </pc:sldMkLst>
-        <pc:picChg chg="mod">
-          <ac:chgData name="Usuario invitado" userId="S::urn:spo:anon#416cc96c5a3d7e9fc3bf7bce4ff7d30c927622a9fd6272cd08bafe94d85b1603::" providerId="AD" clId="Web-{30964437-2AAC-4A10-9742-A5F15A6E61AC}" dt="2022-03-10T14:49:33.683" v="0" actId="1076"/>
+        <pc:spChg chg="mod">
+          <ac:chgData name="CACERES CASTRO XIMENA LIZETH" userId="f563d6b3-b530-416d-a121-a47ff68979ea" providerId="ADAL" clId="{1F03FFFF-2808-4650-8B6F-6016474D36FF}" dt="2022-03-02T18:05:08.442" v="157" actId="113"/>
+          <ac:spMkLst>
+            <pc:docMk/>
+            <pc:sldMk cId="1324508986" sldId="257"/>
+            <ac:spMk id="2" creationId="{6E14B5F6-1BA0-4A42-B973-7CD1B07FDCE3}"/>
+          </ac:spMkLst>
+        </pc:spChg>
+      </pc:sldChg>
+      <pc:sldChg chg="addSp delSp modSp mod setBg addAnim modAnim">
+        <pc:chgData name="CACERES CASTRO XIMENA LIZETH" userId="f563d6b3-b530-416d-a121-a47ff68979ea" providerId="ADAL" clId="{1F03FFFF-2808-4650-8B6F-6016474D36FF}" dt="2022-03-02T18:04:58.810" v="155" actId="113"/>
+        <pc:sldMkLst>
+          <pc:docMk/>
+          <pc:sldMk cId="1796714290" sldId="264"/>
+        </pc:sldMkLst>
+        <pc:spChg chg="mod">
+          <ac:chgData name="CACERES CASTRO XIMENA LIZETH" userId="f563d6b3-b530-416d-a121-a47ff68979ea" providerId="ADAL" clId="{1F03FFFF-2808-4650-8B6F-6016474D36FF}" dt="2022-03-02T18:04:58.810" v="155" actId="113"/>
+          <ac:spMkLst>
+            <pc:docMk/>
+            <pc:sldMk cId="1796714290" sldId="264"/>
+            <ac:spMk id="2" creationId="{FD4557E2-C4D0-4E10-9F91-29113A7F0DA5}"/>
+          </ac:spMkLst>
+        </pc:spChg>
+        <pc:spChg chg="mod">
+          <ac:chgData name="CACERES CASTRO XIMENA LIZETH" userId="f563d6b3-b530-416d-a121-a47ff68979ea" providerId="ADAL" clId="{1F03FFFF-2808-4650-8B6F-6016474D36FF}" dt="2022-03-02T18:04:43.918" v="154" actId="403"/>
+          <ac:spMkLst>
+            <pc:docMk/>
+            <pc:sldMk cId="1796714290" sldId="264"/>
+            <ac:spMk id="3" creationId="{FBC0CC10-2E4D-4F58-9470-3AF9AB02377B}"/>
+          </ac:spMkLst>
+        </pc:spChg>
+        <pc:spChg chg="add del">
+          <ac:chgData name="CACERES CASTRO XIMENA LIZETH" userId="f563d6b3-b530-416d-a121-a47ff68979ea" providerId="ADAL" clId="{1F03FFFF-2808-4650-8B6F-6016474D36FF}" dt="2022-03-02T18:00:05.273" v="68" actId="26606"/>
+          <ac:spMkLst>
+            <pc:docMk/>
+            <pc:sldMk cId="1796714290" sldId="264"/>
+            <ac:spMk id="8" creationId="{907EF6B7-1338-4443-8C46-6A318D952DFD}"/>
+          </ac:spMkLst>
+        </pc:spChg>
+        <pc:spChg chg="add del">
+          <ac:chgData name="CACERES CASTRO XIMENA LIZETH" userId="f563d6b3-b530-416d-a121-a47ff68979ea" providerId="ADAL" clId="{1F03FFFF-2808-4650-8B6F-6016474D36FF}" dt="2022-03-02T18:00:05.273" v="68" actId="26606"/>
+          <ac:spMkLst>
+            <pc:docMk/>
+            <pc:sldMk cId="1796714290" sldId="264"/>
+            <ac:spMk id="10" creationId="{DAAE4CDD-124C-4DCF-9584-B6033B545DD5}"/>
+          </ac:spMkLst>
+        </pc:spChg>
+        <pc:spChg chg="add del">
+          <ac:chgData name="CACERES CASTRO XIMENA LIZETH" userId="f563d6b3-b530-416d-a121-a47ff68979ea" providerId="ADAL" clId="{1F03FFFF-2808-4650-8B6F-6016474D36FF}" dt="2022-03-02T18:00:05.273" v="68" actId="26606"/>
+          <ac:spMkLst>
+            <pc:docMk/>
+            <pc:sldMk cId="1796714290" sldId="264"/>
+            <ac:spMk id="12" creationId="{081E4A58-353D-44AE-B2FC-2A74E2E400F7}"/>
+          </ac:spMkLst>
+        </pc:spChg>
+        <pc:spChg chg="add del">
+          <ac:chgData name="CACERES CASTRO XIMENA LIZETH" userId="f563d6b3-b530-416d-a121-a47ff68979ea" providerId="ADAL" clId="{1F03FFFF-2808-4650-8B6F-6016474D36FF}" dt="2022-03-02T18:00:34.763" v="71" actId="26606"/>
+          <ac:spMkLst>
+            <pc:docMk/>
+            <pc:sldMk cId="1796714290" sldId="264"/>
+            <ac:spMk id="17" creationId="{8E2CC403-21CD-41DF-BAC4-329D7FF03C5C}"/>
+          </ac:spMkLst>
+        </pc:spChg>
+        <pc:spChg chg="add del">
+          <ac:chgData name="CACERES CASTRO XIMENA LIZETH" userId="f563d6b3-b530-416d-a121-a47ff68979ea" providerId="ADAL" clId="{1F03FFFF-2808-4650-8B6F-6016474D36FF}" dt="2022-03-02T18:00:34.763" v="71" actId="26606"/>
+          <ac:spMkLst>
+            <pc:docMk/>
+            <pc:sldMk cId="1796714290" sldId="264"/>
+            <ac:spMk id="24" creationId="{7653717E-6F8C-43E0-9893-C03AE87D18D6}"/>
+          </ac:spMkLst>
+        </pc:spChg>
+        <pc:spChg chg="add del">
+          <ac:chgData name="CACERES CASTRO XIMENA LIZETH" userId="f563d6b3-b530-416d-a121-a47ff68979ea" providerId="ADAL" clId="{1F03FFFF-2808-4650-8B6F-6016474D36FF}" dt="2022-03-02T18:00:34.763" v="71" actId="26606"/>
+          <ac:spMkLst>
+            <pc:docMk/>
+            <pc:sldMk cId="1796714290" sldId="264"/>
+            <ac:spMk id="26" creationId="{35BB14B4-EC3F-47C7-9AF3-B0E017B75C42}"/>
+          </ac:spMkLst>
+        </pc:spChg>
+        <pc:spChg chg="add del">
+          <ac:chgData name="CACERES CASTRO XIMENA LIZETH" userId="f563d6b3-b530-416d-a121-a47ff68979ea" providerId="ADAL" clId="{1F03FFFF-2808-4650-8B6F-6016474D36FF}" dt="2022-03-02T18:00:34.748" v="70" actId="26606"/>
+          <ac:spMkLst>
+            <pc:docMk/>
+            <pc:sldMk cId="1796714290" sldId="264"/>
+            <ac:spMk id="31" creationId="{8B9AA7C6-5E5A-498E-A6DF-A943376E09BC}"/>
+          </ac:spMkLst>
+        </pc:spChg>
+        <pc:spChg chg="add del">
+          <ac:chgData name="CACERES CASTRO XIMENA LIZETH" userId="f563d6b3-b530-416d-a121-a47ff68979ea" providerId="ADAL" clId="{1F03FFFF-2808-4650-8B6F-6016474D36FF}" dt="2022-03-02T18:00:34.748" v="70" actId="26606"/>
+          <ac:spMkLst>
+            <pc:docMk/>
+            <pc:sldMk cId="1796714290" sldId="264"/>
+            <ac:spMk id="37" creationId="{81E140AE-0ABF-47C8-BF32-7D2F0CF2BA44}"/>
+          </ac:spMkLst>
+        </pc:spChg>
+        <pc:spChg chg="add del">
+          <ac:chgData name="CACERES CASTRO XIMENA LIZETH" userId="f563d6b3-b530-416d-a121-a47ff68979ea" providerId="ADAL" clId="{1F03FFFF-2808-4650-8B6F-6016474D36FF}" dt="2022-03-02T18:04:22.565" v="151" actId="26606"/>
+          <ac:spMkLst>
+            <pc:docMk/>
+            <pc:sldMk cId="1796714290" sldId="264"/>
+            <ac:spMk id="38" creationId="{3C48EA58-53D6-4E4A-9BDB-087D34617836}"/>
+          </ac:spMkLst>
+        </pc:spChg>
+        <pc:spChg chg="add del">
+          <ac:chgData name="CACERES CASTRO XIMENA LIZETH" userId="f563d6b3-b530-416d-a121-a47ff68979ea" providerId="ADAL" clId="{1F03FFFF-2808-4650-8B6F-6016474D36FF}" dt="2022-03-02T18:00:34.748" v="70" actId="26606"/>
+          <ac:spMkLst>
+            <pc:docMk/>
+            <pc:sldMk cId="1796714290" sldId="264"/>
+            <ac:spMk id="39" creationId="{CBC4F608-B4B8-48C3-9572-C0F061B1CD99}"/>
+          </ac:spMkLst>
+        </pc:spChg>
+        <pc:spChg chg="add del">
+          <ac:chgData name="CACERES CASTRO XIMENA LIZETH" userId="f563d6b3-b530-416d-a121-a47ff68979ea" providerId="ADAL" clId="{1F03FFFF-2808-4650-8B6F-6016474D36FF}" dt="2022-03-02T18:04:22.565" v="151" actId="26606"/>
+          <ac:spMkLst>
+            <pc:docMk/>
+            <pc:sldMk cId="1796714290" sldId="264"/>
+            <ac:spMk id="41" creationId="{C4B24C7E-2D5E-4C4E-9CD5-D61F243C9D1B}"/>
+          </ac:spMkLst>
+        </pc:spChg>
+        <pc:spChg chg="add">
+          <ac:chgData name="CACERES CASTRO XIMENA LIZETH" userId="f563d6b3-b530-416d-a121-a47ff68979ea" providerId="ADAL" clId="{1F03FFFF-2808-4650-8B6F-6016474D36FF}" dt="2022-03-02T18:04:22.565" v="151" actId="26606"/>
+          <ac:spMkLst>
+            <pc:docMk/>
+            <pc:sldMk cId="1796714290" sldId="264"/>
+            <ac:spMk id="45" creationId="{B6CDA21F-E7AF-4C75-8395-33F58D5B0E45}"/>
+          </ac:spMkLst>
+        </pc:spChg>
+        <pc:spChg chg="add">
+          <ac:chgData name="CACERES CASTRO XIMENA LIZETH" userId="f563d6b3-b530-416d-a121-a47ff68979ea" providerId="ADAL" clId="{1F03FFFF-2808-4650-8B6F-6016474D36FF}" dt="2022-03-02T18:04:22.565" v="151" actId="26606"/>
+          <ac:spMkLst>
+            <pc:docMk/>
+            <pc:sldMk cId="1796714290" sldId="264"/>
+            <ac:spMk id="47" creationId="{D5B0017B-2ECA-49AF-B397-DC140825DF8D}"/>
+          </ac:spMkLst>
+        </pc:spChg>
+        <pc:spChg chg="add del">
+          <ac:chgData name="CACERES CASTRO XIMENA LIZETH" userId="f563d6b3-b530-416d-a121-a47ff68979ea" providerId="ADAL" clId="{1F03FFFF-2808-4650-8B6F-6016474D36FF}" dt="2022-03-02T18:02:23.996" v="94" actId="26606"/>
+          <ac:spMkLst>
+            <pc:docMk/>
+            <pc:sldMk cId="1796714290" sldId="264"/>
+            <ac:spMk id="48" creationId="{8E2CC403-21CD-41DF-BAC4-329D7FF03C5C}"/>
+          </ac:spMkLst>
+        </pc:spChg>
+        <pc:spChg chg="add del">
+          <ac:chgData name="CACERES CASTRO XIMENA LIZETH" userId="f563d6b3-b530-416d-a121-a47ff68979ea" providerId="ADAL" clId="{1F03FFFF-2808-4650-8B6F-6016474D36FF}" dt="2022-03-02T18:02:33.084" v="96" actId="26606"/>
+          <ac:spMkLst>
+            <pc:docMk/>
+            <pc:sldMk cId="1796714290" sldId="264"/>
+            <ac:spMk id="54" creationId="{871AEA07-1E14-44B4-8E55-64EF049CD66F}"/>
+          </ac:spMkLst>
+        </pc:spChg>
+        <pc:spChg chg="add del">
+          <ac:chgData name="CACERES CASTRO XIMENA LIZETH" userId="f563d6b3-b530-416d-a121-a47ff68979ea" providerId="ADAL" clId="{1F03FFFF-2808-4650-8B6F-6016474D36FF}" dt="2022-03-02T18:02:23.996" v="94" actId="26606"/>
+          <ac:spMkLst>
+            <pc:docMk/>
+            <pc:sldMk cId="1796714290" sldId="264"/>
+            <ac:spMk id="55" creationId="{7653717E-6F8C-43E0-9893-C03AE87D18D6}"/>
+          </ac:spMkLst>
+        </pc:spChg>
+        <pc:spChg chg="add del">
+          <ac:chgData name="CACERES CASTRO XIMENA LIZETH" userId="f563d6b3-b530-416d-a121-a47ff68979ea" providerId="ADAL" clId="{1F03FFFF-2808-4650-8B6F-6016474D36FF}" dt="2022-03-02T18:02:37.098" v="98" actId="26606"/>
+          <ac:spMkLst>
+            <pc:docMk/>
+            <pc:sldMk cId="1796714290" sldId="264"/>
+            <ac:spMk id="56" creationId="{CBC4F608-B4B8-48C3-9572-C0F061B1CD99}"/>
+          </ac:spMkLst>
+        </pc:spChg>
+        <pc:spChg chg="add del">
+          <ac:chgData name="CACERES CASTRO XIMENA LIZETH" userId="f563d6b3-b530-416d-a121-a47ff68979ea" providerId="ADAL" clId="{1F03FFFF-2808-4650-8B6F-6016474D36FF}" dt="2022-03-02T18:02:23.996" v="94" actId="26606"/>
+          <ac:spMkLst>
+            <pc:docMk/>
+            <pc:sldMk cId="1796714290" sldId="264"/>
+            <ac:spMk id="57" creationId="{35BB14B4-EC3F-47C7-9AF3-B0E017B75C42}"/>
+          </ac:spMkLst>
+        </pc:spChg>
+        <pc:spChg chg="add del">
+          <ac:chgData name="CACERES CASTRO XIMENA LIZETH" userId="f563d6b3-b530-416d-a121-a47ff68979ea" providerId="ADAL" clId="{1F03FFFF-2808-4650-8B6F-6016474D36FF}" dt="2022-03-02T18:02:33.084" v="96" actId="26606"/>
+          <ac:spMkLst>
+            <pc:docMk/>
+            <pc:sldMk cId="1796714290" sldId="264"/>
+            <ac:spMk id="59" creationId="{9095C1F4-AE7F-44E4-8693-40D3D6831140}"/>
+          </ac:spMkLst>
+        </pc:spChg>
+        <pc:spChg chg="add del">
+          <ac:chgData name="CACERES CASTRO XIMENA LIZETH" userId="f563d6b3-b530-416d-a121-a47ff68979ea" providerId="ADAL" clId="{1F03FFFF-2808-4650-8B6F-6016474D36FF}" dt="2022-03-02T18:02:37.098" v="98" actId="26606"/>
+          <ac:spMkLst>
+            <pc:docMk/>
+            <pc:sldMk cId="1796714290" sldId="264"/>
+            <ac:spMk id="64" creationId="{8B9AA7C6-5E5A-498E-A6DF-A943376E09BC}"/>
+          </ac:spMkLst>
+        </pc:spChg>
+        <pc:spChg chg="add del">
+          <ac:chgData name="CACERES CASTRO XIMENA LIZETH" userId="f563d6b3-b530-416d-a121-a47ff68979ea" providerId="ADAL" clId="{1F03FFFF-2808-4650-8B6F-6016474D36FF}" dt="2022-03-02T18:02:37.098" v="98" actId="26606"/>
+          <ac:spMkLst>
+            <pc:docMk/>
+            <pc:sldMk cId="1796714290" sldId="264"/>
+            <ac:spMk id="66" creationId="{81E140AE-0ABF-47C8-BF32-7D2F0CF2BA44}"/>
+          </ac:spMkLst>
+        </pc:spChg>
+        <pc:spChg chg="add del">
+          <ac:chgData name="CACERES CASTRO XIMENA LIZETH" userId="f563d6b3-b530-416d-a121-a47ff68979ea" providerId="ADAL" clId="{1F03FFFF-2808-4650-8B6F-6016474D36FF}" dt="2022-03-02T18:02:38.823" v="100" actId="26606"/>
+          <ac:spMkLst>
+            <pc:docMk/>
+            <pc:sldMk cId="1796714290" sldId="264"/>
+            <ac:spMk id="68" creationId="{8E2CC403-21CD-41DF-BAC4-329D7FF03C5C}"/>
+          </ac:spMkLst>
+        </pc:spChg>
+        <pc:spChg chg="add del">
+          <ac:chgData name="CACERES CASTRO XIMENA LIZETH" userId="f563d6b3-b530-416d-a121-a47ff68979ea" providerId="ADAL" clId="{1F03FFFF-2808-4650-8B6F-6016474D36FF}" dt="2022-03-02T18:02:38.823" v="100" actId="26606"/>
+          <ac:spMkLst>
+            <pc:docMk/>
+            <pc:sldMk cId="1796714290" sldId="264"/>
+            <ac:spMk id="71" creationId="{7653717E-6F8C-43E0-9893-C03AE87D18D6}"/>
+          </ac:spMkLst>
+        </pc:spChg>
+        <pc:spChg chg="add del">
+          <ac:chgData name="CACERES CASTRO XIMENA LIZETH" userId="f563d6b3-b530-416d-a121-a47ff68979ea" providerId="ADAL" clId="{1F03FFFF-2808-4650-8B6F-6016474D36FF}" dt="2022-03-02T18:02:38.823" v="100" actId="26606"/>
+          <ac:spMkLst>
+            <pc:docMk/>
+            <pc:sldMk cId="1796714290" sldId="264"/>
+            <ac:spMk id="72" creationId="{35BB14B4-EC3F-47C7-9AF3-B0E017B75C42}"/>
+          </ac:spMkLst>
+        </pc:spChg>
+        <pc:spChg chg="add del">
+          <ac:chgData name="CACERES CASTRO XIMENA LIZETH" userId="f563d6b3-b530-416d-a121-a47ff68979ea" providerId="ADAL" clId="{1F03FFFF-2808-4650-8B6F-6016474D36FF}" dt="2022-03-02T18:02:51.333" v="102" actId="26606"/>
+          <ac:spMkLst>
+            <pc:docMk/>
+            <pc:sldMk cId="1796714290" sldId="264"/>
+            <ac:spMk id="74" creationId="{8B9AA7C6-5E5A-498E-A6DF-A943376E09BC}"/>
+          </ac:spMkLst>
+        </pc:spChg>
+        <pc:spChg chg="add del">
+          <ac:chgData name="CACERES CASTRO XIMENA LIZETH" userId="f563d6b3-b530-416d-a121-a47ff68979ea" providerId="ADAL" clId="{1F03FFFF-2808-4650-8B6F-6016474D36FF}" dt="2022-03-02T18:02:51.333" v="102" actId="26606"/>
+          <ac:spMkLst>
+            <pc:docMk/>
+            <pc:sldMk cId="1796714290" sldId="264"/>
+            <ac:spMk id="77" creationId="{81E140AE-0ABF-47C8-BF32-7D2F0CF2BA44}"/>
+          </ac:spMkLst>
+        </pc:spChg>
+        <pc:spChg chg="add del">
+          <ac:chgData name="CACERES CASTRO XIMENA LIZETH" userId="f563d6b3-b530-416d-a121-a47ff68979ea" providerId="ADAL" clId="{1F03FFFF-2808-4650-8B6F-6016474D36FF}" dt="2022-03-02T18:02:51.333" v="102" actId="26606"/>
+          <ac:spMkLst>
+            <pc:docMk/>
+            <pc:sldMk cId="1796714290" sldId="264"/>
+            <ac:spMk id="78" creationId="{CBC4F608-B4B8-48C3-9572-C0F061B1CD99}"/>
+          </ac:spMkLst>
+        </pc:spChg>
+        <pc:spChg chg="add del">
+          <ac:chgData name="CACERES CASTRO XIMENA LIZETH" userId="f563d6b3-b530-416d-a121-a47ff68979ea" providerId="ADAL" clId="{1F03FFFF-2808-4650-8B6F-6016474D36FF}" dt="2022-03-02T18:03:01.171" v="104" actId="26606"/>
+          <ac:spMkLst>
+            <pc:docMk/>
+            <pc:sldMk cId="1796714290" sldId="264"/>
+            <ac:spMk id="80" creationId="{8E2CC403-21CD-41DF-BAC4-329D7FF03C5C}"/>
+          </ac:spMkLst>
+        </pc:spChg>
+        <pc:spChg chg="add del">
+          <ac:chgData name="CACERES CASTRO XIMENA LIZETH" userId="f563d6b3-b530-416d-a121-a47ff68979ea" providerId="ADAL" clId="{1F03FFFF-2808-4650-8B6F-6016474D36FF}" dt="2022-03-02T18:03:01.171" v="104" actId="26606"/>
+          <ac:spMkLst>
+            <pc:docMk/>
+            <pc:sldMk cId="1796714290" sldId="264"/>
+            <ac:spMk id="83" creationId="{7653717E-6F8C-43E0-9893-C03AE87D18D6}"/>
+          </ac:spMkLst>
+        </pc:spChg>
+        <pc:spChg chg="add del">
+          <ac:chgData name="CACERES CASTRO XIMENA LIZETH" userId="f563d6b3-b530-416d-a121-a47ff68979ea" providerId="ADAL" clId="{1F03FFFF-2808-4650-8B6F-6016474D36FF}" dt="2022-03-02T18:03:01.171" v="104" actId="26606"/>
+          <ac:spMkLst>
+            <pc:docMk/>
+            <pc:sldMk cId="1796714290" sldId="264"/>
+            <ac:spMk id="84" creationId="{35BB14B4-EC3F-47C7-9AF3-B0E017B75C42}"/>
+          </ac:spMkLst>
+        </pc:spChg>
+        <pc:spChg chg="add del">
+          <ac:chgData name="CACERES CASTRO XIMENA LIZETH" userId="f563d6b3-b530-416d-a121-a47ff68979ea" providerId="ADAL" clId="{1F03FFFF-2808-4650-8B6F-6016474D36FF}" dt="2022-03-02T18:03:39.292" v="138" actId="26606"/>
+          <ac:spMkLst>
+            <pc:docMk/>
+            <pc:sldMk cId="1796714290" sldId="264"/>
+            <ac:spMk id="86" creationId="{A7895A40-19A4-42D6-9D30-DBC1E8002635}"/>
+          </ac:spMkLst>
+        </pc:spChg>
+        <pc:spChg chg="add del">
+          <ac:chgData name="CACERES CASTRO XIMENA LIZETH" userId="f563d6b3-b530-416d-a121-a47ff68979ea" providerId="ADAL" clId="{1F03FFFF-2808-4650-8B6F-6016474D36FF}" dt="2022-03-02T18:03:39.292" v="138" actId="26606"/>
+          <ac:spMkLst>
+            <pc:docMk/>
+            <pc:sldMk cId="1796714290" sldId="264"/>
+            <ac:spMk id="87" creationId="{02F429C4-ABC9-46FC-818A-B5429CDE4A96}"/>
+          </ac:spMkLst>
+        </pc:spChg>
+        <pc:spChg chg="add del">
+          <ac:chgData name="CACERES CASTRO XIMENA LIZETH" userId="f563d6b3-b530-416d-a121-a47ff68979ea" providerId="ADAL" clId="{1F03FFFF-2808-4650-8B6F-6016474D36FF}" dt="2022-03-02T18:03:39.292" v="138" actId="26606"/>
+          <ac:spMkLst>
+            <pc:docMk/>
+            <pc:sldMk cId="1796714290" sldId="264"/>
+            <ac:spMk id="88" creationId="{2CEF98E4-3709-4952-8F42-2305CCE34FA3}"/>
+          </ac:spMkLst>
+        </pc:spChg>
+        <pc:spChg chg="add del">
+          <ac:chgData name="CACERES CASTRO XIMENA LIZETH" userId="f563d6b3-b530-416d-a121-a47ff68979ea" providerId="ADAL" clId="{1F03FFFF-2808-4650-8B6F-6016474D36FF}" dt="2022-03-02T18:03:39.292" v="138" actId="26606"/>
+          <ac:spMkLst>
+            <pc:docMk/>
+            <pc:sldMk cId="1796714290" sldId="264"/>
+            <ac:spMk id="89" creationId="{F10BCCF5-D685-47FF-B675-647EAEB72C8E}"/>
+          </ac:spMkLst>
+        </pc:spChg>
+        <pc:spChg chg="add del">
+          <ac:chgData name="CACERES CASTRO XIMENA LIZETH" userId="f563d6b3-b530-416d-a121-a47ff68979ea" providerId="ADAL" clId="{1F03FFFF-2808-4650-8B6F-6016474D36FF}" dt="2022-03-02T18:03:39.292" v="138" actId="26606"/>
+          <ac:spMkLst>
+            <pc:docMk/>
+            <pc:sldMk cId="1796714290" sldId="264"/>
+            <ac:spMk id="90" creationId="{B0EE8A42-107A-4D4C-8D56-BBAE95C7FC0D}"/>
+          </ac:spMkLst>
+        </pc:spChg>
+        <pc:grpChg chg="add del">
+          <ac:chgData name="CACERES CASTRO XIMENA LIZETH" userId="f563d6b3-b530-416d-a121-a47ff68979ea" providerId="ADAL" clId="{1F03FFFF-2808-4650-8B6F-6016474D36FF}" dt="2022-03-02T18:00:34.763" v="71" actId="26606"/>
+          <ac:grpSpMkLst>
+            <pc:docMk/>
+            <pc:sldMk cId="1796714290" sldId="264"/>
+            <ac:grpSpMk id="19" creationId="{B13AA5FE-3FFC-4725-9ADD-E428544EC61B}"/>
+          </ac:grpSpMkLst>
+        </pc:grpChg>
+        <pc:grpChg chg="add del">
+          <ac:chgData name="CACERES CASTRO XIMENA LIZETH" userId="f563d6b3-b530-416d-a121-a47ff68979ea" providerId="ADAL" clId="{1F03FFFF-2808-4650-8B6F-6016474D36FF}" dt="2022-03-02T18:00:34.748" v="70" actId="26606"/>
+          <ac:grpSpMkLst>
+            <pc:docMk/>
+            <pc:sldMk cId="1796714290" sldId="264"/>
+            <ac:grpSpMk id="33" creationId="{83EAB11A-76F7-48F4-9B4F-5BFDF4BF9670}"/>
+          </ac:grpSpMkLst>
+        </pc:grpChg>
+        <pc:grpChg chg="add del">
+          <ac:chgData name="CACERES CASTRO XIMENA LIZETH" userId="f563d6b3-b530-416d-a121-a47ff68979ea" providerId="ADAL" clId="{1F03FFFF-2808-4650-8B6F-6016474D36FF}" dt="2022-03-02T18:04:22.565" v="151" actId="26606"/>
+          <ac:grpSpMkLst>
+            <pc:docMk/>
+            <pc:sldMk cId="1796714290" sldId="264"/>
+            <ac:grpSpMk id="42" creationId="{99072643-A0EC-42FB-B66A-24C0E6FFDC96}"/>
+          </ac:grpSpMkLst>
+        </pc:grpChg>
+        <pc:grpChg chg="add">
+          <ac:chgData name="CACERES CASTRO XIMENA LIZETH" userId="f563d6b3-b530-416d-a121-a47ff68979ea" providerId="ADAL" clId="{1F03FFFF-2808-4650-8B6F-6016474D36FF}" dt="2022-03-02T18:04:22.565" v="151" actId="26606"/>
+          <ac:grpSpMkLst>
+            <pc:docMk/>
+            <pc:sldMk cId="1796714290" sldId="264"/>
+            <ac:grpSpMk id="46" creationId="{AE1C45F0-260A-458C-96ED-C1F6D2151219}"/>
+          </ac:grpSpMkLst>
+        </pc:grpChg>
+        <pc:grpChg chg="add del">
+          <ac:chgData name="CACERES CASTRO XIMENA LIZETH" userId="f563d6b3-b530-416d-a121-a47ff68979ea" providerId="ADAL" clId="{1F03FFFF-2808-4650-8B6F-6016474D36FF}" dt="2022-03-02T18:02:23.996" v="94" actId="26606"/>
+          <ac:grpSpMkLst>
+            <pc:docMk/>
+            <pc:sldMk cId="1796714290" sldId="264"/>
+            <ac:grpSpMk id="50" creationId="{B13AA5FE-3FFC-4725-9ADD-E428544EC61B}"/>
+          </ac:grpSpMkLst>
+        </pc:grpChg>
+        <pc:grpChg chg="add del">
+          <ac:chgData name="CACERES CASTRO XIMENA LIZETH" userId="f563d6b3-b530-416d-a121-a47ff68979ea" providerId="ADAL" clId="{1F03FFFF-2808-4650-8B6F-6016474D36FF}" dt="2022-03-02T18:02:33.084" v="96" actId="26606"/>
+          <ac:grpSpMkLst>
+            <pc:docMk/>
+            <pc:sldMk cId="1796714290" sldId="264"/>
+            <ac:grpSpMk id="60" creationId="{8734DDD3-F723-4DD3-8ABE-EC0B2AC87D74}"/>
+          </ac:grpSpMkLst>
+        </pc:grpChg>
+        <pc:grpChg chg="add del">
+          <ac:chgData name="CACERES CASTRO XIMENA LIZETH" userId="f563d6b3-b530-416d-a121-a47ff68979ea" providerId="ADAL" clId="{1F03FFFF-2808-4650-8B6F-6016474D36FF}" dt="2022-03-02T18:02:37.098" v="98" actId="26606"/>
+          <ac:grpSpMkLst>
+            <pc:docMk/>
+            <pc:sldMk cId="1796714290" sldId="264"/>
+            <ac:grpSpMk id="65" creationId="{83EAB11A-76F7-48F4-9B4F-5BFDF4BF9670}"/>
+          </ac:grpSpMkLst>
+        </pc:grpChg>
+        <pc:grpChg chg="add del">
+          <ac:chgData name="CACERES CASTRO XIMENA LIZETH" userId="f563d6b3-b530-416d-a121-a47ff68979ea" providerId="ADAL" clId="{1F03FFFF-2808-4650-8B6F-6016474D36FF}" dt="2022-03-02T18:02:38.823" v="100" actId="26606"/>
+          <ac:grpSpMkLst>
+            <pc:docMk/>
+            <pc:sldMk cId="1796714290" sldId="264"/>
+            <ac:grpSpMk id="69" creationId="{B13AA5FE-3FFC-4725-9ADD-E428544EC61B}"/>
+          </ac:grpSpMkLst>
+        </pc:grpChg>
+        <pc:grpChg chg="add del">
+          <ac:chgData name="CACERES CASTRO XIMENA LIZETH" userId="f563d6b3-b530-416d-a121-a47ff68979ea" providerId="ADAL" clId="{1F03FFFF-2808-4650-8B6F-6016474D36FF}" dt="2022-03-02T18:02:51.333" v="102" actId="26606"/>
+          <ac:grpSpMkLst>
+            <pc:docMk/>
+            <pc:sldMk cId="1796714290" sldId="264"/>
+            <ac:grpSpMk id="75" creationId="{83EAB11A-76F7-48F4-9B4F-5BFDF4BF9670}"/>
+          </ac:grpSpMkLst>
+        </pc:grpChg>
+        <pc:grpChg chg="add del">
+          <ac:chgData name="CACERES CASTRO XIMENA LIZETH" userId="f563d6b3-b530-416d-a121-a47ff68979ea" providerId="ADAL" clId="{1F03FFFF-2808-4650-8B6F-6016474D36FF}" dt="2022-03-02T18:03:01.171" v="104" actId="26606"/>
+          <ac:grpSpMkLst>
+            <pc:docMk/>
+            <pc:sldMk cId="1796714290" sldId="264"/>
+            <ac:grpSpMk id="81" creationId="{B13AA5FE-3FFC-4725-9ADD-E428544EC61B}"/>
+          </ac:grpSpMkLst>
+        </pc:grpChg>
+        <pc:cxnChg chg="add">
+          <ac:chgData name="CACERES CASTRO XIMENA LIZETH" userId="f563d6b3-b530-416d-a121-a47ff68979ea" providerId="ADAL" clId="{1F03FFFF-2808-4650-8B6F-6016474D36FF}" dt="2022-03-02T18:04:22.565" v="151" actId="26606"/>
+          <ac:cxnSpMkLst>
+            <pc:docMk/>
+            <pc:sldMk cId="1796714290" sldId="264"/>
+            <ac:cxnSpMk id="49" creationId="{6CF1BAF6-AD41-4082-B212-8A1F9A2E8779}"/>
+          </ac:cxnSpMkLst>
+        </pc:cxnChg>
+      </pc:sldChg>
+      <pc:sldChg chg="addSp modSp mod setBg">
+        <pc:chgData name="CACERES CASTRO XIMENA LIZETH" userId="f563d6b3-b530-416d-a121-a47ff68979ea" providerId="ADAL" clId="{1F03FFFF-2808-4650-8B6F-6016474D36FF}" dt="2022-03-02T17:57:01.161" v="44" actId="20577"/>
+        <pc:sldMkLst>
+          <pc:docMk/>
+          <pc:sldMk cId="2610895302" sldId="265"/>
+        </pc:sldMkLst>
+        <pc:spChg chg="mod">
+          <ac:chgData name="CACERES CASTRO XIMENA LIZETH" userId="f563d6b3-b530-416d-a121-a47ff68979ea" providerId="ADAL" clId="{1F03FFFF-2808-4650-8B6F-6016474D36FF}" dt="2022-03-02T17:56:19.008" v="42" actId="113"/>
+          <ac:spMkLst>
+            <pc:docMk/>
+            <pc:sldMk cId="2610895302" sldId="265"/>
+            <ac:spMk id="2" creationId="{FD45C9A1-C0FE-484E-A43E-DD798059A690}"/>
+          </ac:spMkLst>
+        </pc:spChg>
+        <pc:spChg chg="mod">
+          <ac:chgData name="CACERES CASTRO XIMENA LIZETH" userId="f563d6b3-b530-416d-a121-a47ff68979ea" providerId="ADAL" clId="{1F03FFFF-2808-4650-8B6F-6016474D36FF}" dt="2022-03-02T17:57:01.161" v="44" actId="20577"/>
+          <ac:spMkLst>
+            <pc:docMk/>
+            <pc:sldMk cId="2610895302" sldId="265"/>
+            <ac:spMk id="3" creationId="{AB04D9CD-5536-4DA9-8D3A-31F8F173D6E9}"/>
+          </ac:spMkLst>
+        </pc:spChg>
+        <pc:spChg chg="add">
+          <ac:chgData name="CACERES CASTRO XIMENA LIZETH" userId="f563d6b3-b530-416d-a121-a47ff68979ea" providerId="ADAL" clId="{1F03FFFF-2808-4650-8B6F-6016474D36FF}" dt="2022-03-02T17:56:02.716" v="40" actId="26606"/>
+          <ac:spMkLst>
+            <pc:docMk/>
+            <pc:sldMk cId="2610895302" sldId="265"/>
+            <ac:spMk id="8" creationId="{1BB867FF-FC45-48F7-8104-F89BE54909F1}"/>
+          </ac:spMkLst>
+        </pc:spChg>
+        <pc:spChg chg="add">
+          <ac:chgData name="CACERES CASTRO XIMENA LIZETH" userId="f563d6b3-b530-416d-a121-a47ff68979ea" providerId="ADAL" clId="{1F03FFFF-2808-4650-8B6F-6016474D36FF}" dt="2022-03-02T17:56:02.716" v="40" actId="26606"/>
+          <ac:spMkLst>
+            <pc:docMk/>
+            <pc:sldMk cId="2610895302" sldId="265"/>
+            <ac:spMk id="10" creationId="{8BB56887-D0D5-4F0C-9E19-7247EB83C8B7}"/>
+          </ac:spMkLst>
+        </pc:spChg>
+        <pc:spChg chg="add">
+          <ac:chgData name="CACERES CASTRO XIMENA LIZETH" userId="f563d6b3-b530-416d-a121-a47ff68979ea" providerId="ADAL" clId="{1F03FFFF-2808-4650-8B6F-6016474D36FF}" dt="2022-03-02T17:56:02.716" v="40" actId="26606"/>
+          <ac:spMkLst>
+            <pc:docMk/>
+            <pc:sldMk cId="2610895302" sldId="265"/>
+            <ac:spMk id="12" creationId="{081E4A58-353D-44AE-B2FC-2A74E2E400F7}"/>
+          </ac:spMkLst>
+        </pc:spChg>
+      </pc:sldChg>
+      <pc:sldChg chg="addSp delSp modSp new mod setBg addAnim delAnim">
+        <pc:chgData name="CACERES CASTRO XIMENA LIZETH" userId="f563d6b3-b530-416d-a121-a47ff68979ea" providerId="ADAL" clId="{1F03FFFF-2808-4650-8B6F-6016474D36FF}" dt="2022-03-02T18:06:10.877" v="161" actId="20577"/>
+        <pc:sldMkLst>
+          <pc:docMk/>
+          <pc:sldMk cId="3035593005" sldId="266"/>
+        </pc:sldMkLst>
+        <pc:spChg chg="mod">
+          <ac:chgData name="CACERES CASTRO XIMENA LIZETH" userId="f563d6b3-b530-416d-a121-a47ff68979ea" providerId="ADAL" clId="{1F03FFFF-2808-4650-8B6F-6016474D36FF}" dt="2022-03-02T18:06:10.877" v="161" actId="20577"/>
+          <ac:spMkLst>
+            <pc:docMk/>
+            <pc:sldMk cId="3035593005" sldId="266"/>
+            <ac:spMk id="2" creationId="{444F7C14-DC83-46E5-AF88-17FE83FAAA2C}"/>
+          </ac:spMkLst>
+        </pc:spChg>
+        <pc:spChg chg="del">
+          <ac:chgData name="CACERES CASTRO XIMENA LIZETH" userId="f563d6b3-b530-416d-a121-a47ff68979ea" providerId="ADAL" clId="{1F03FFFF-2808-4650-8B6F-6016474D36FF}" dt="2022-03-02T17:53:39.843" v="25"/>
+          <ac:spMkLst>
+            <pc:docMk/>
+            <pc:sldMk cId="3035593005" sldId="266"/>
+            <ac:spMk id="3" creationId="{90D62CAC-D9EF-460C-B914-66A3DC71622D}"/>
+          </ac:spMkLst>
+        </pc:spChg>
+        <pc:spChg chg="add del mod">
+          <ac:chgData name="CACERES CASTRO XIMENA LIZETH" userId="f563d6b3-b530-416d-a121-a47ff68979ea" providerId="ADAL" clId="{1F03FFFF-2808-4650-8B6F-6016474D36FF}" dt="2022-03-02T17:54:05.396" v="32" actId="478"/>
+          <ac:spMkLst>
+            <pc:docMk/>
+            <pc:sldMk cId="3035593005" sldId="266"/>
+            <ac:spMk id="7" creationId="{EF80BD98-4622-4FF0-A953-333853463A33}"/>
+          </ac:spMkLst>
+        </pc:spChg>
+        <pc:spChg chg="add del">
+          <ac:chgData name="CACERES CASTRO XIMENA LIZETH" userId="f563d6b3-b530-416d-a121-a47ff68979ea" providerId="ADAL" clId="{1F03FFFF-2808-4650-8B6F-6016474D36FF}" dt="2022-03-02T17:58:09.858" v="57" actId="26606"/>
+          <ac:spMkLst>
+            <pc:docMk/>
+            <pc:sldMk cId="3035593005" sldId="266"/>
+            <ac:spMk id="11" creationId="{BCED4D40-4B67-4331-AC48-79B82B4A47D8}"/>
+          </ac:spMkLst>
+        </pc:spChg>
+        <pc:spChg chg="add del">
+          <ac:chgData name="CACERES CASTRO XIMENA LIZETH" userId="f563d6b3-b530-416d-a121-a47ff68979ea" providerId="ADAL" clId="{1F03FFFF-2808-4650-8B6F-6016474D36FF}" dt="2022-03-02T17:58:09.858" v="57" actId="26606"/>
+          <ac:spMkLst>
+            <pc:docMk/>
+            <pc:sldMk cId="3035593005" sldId="266"/>
+            <ac:spMk id="12" creationId="{670CEDEF-4F34-412E-84EE-329C1E936AF5}"/>
+          </ac:spMkLst>
+        </pc:spChg>
+        <pc:spChg chg="add del">
+          <ac:chgData name="CACERES CASTRO XIMENA LIZETH" userId="f563d6b3-b530-416d-a121-a47ff68979ea" providerId="ADAL" clId="{1F03FFFF-2808-4650-8B6F-6016474D36FF}" dt="2022-03-02T17:57:41.873" v="46" actId="26606"/>
+          <ac:spMkLst>
+            <pc:docMk/>
+            <pc:sldMk cId="3035593005" sldId="266"/>
+            <ac:spMk id="14" creationId="{BCED4D40-4B67-4331-AC48-79B82B4A47D8}"/>
+          </ac:spMkLst>
+        </pc:spChg>
+        <pc:spChg chg="add del">
+          <ac:chgData name="CACERES CASTRO XIMENA LIZETH" userId="f563d6b3-b530-416d-a121-a47ff68979ea" providerId="ADAL" clId="{1F03FFFF-2808-4650-8B6F-6016474D36FF}" dt="2022-03-02T17:58:09.858" v="57" actId="26606"/>
+          <ac:spMkLst>
+            <pc:docMk/>
+            <pc:sldMk cId="3035593005" sldId="266"/>
+            <ac:spMk id="15" creationId="{C1DD1A8A-57D5-4A81-AD04-532B043C5611}"/>
+          </ac:spMkLst>
+        </pc:spChg>
+        <pc:spChg chg="add del">
+          <ac:chgData name="CACERES CASTRO XIMENA LIZETH" userId="f563d6b3-b530-416d-a121-a47ff68979ea" providerId="ADAL" clId="{1F03FFFF-2808-4650-8B6F-6016474D36FF}" dt="2022-03-02T17:57:41.873" v="46" actId="26606"/>
+          <ac:spMkLst>
+            <pc:docMk/>
+            <pc:sldMk cId="3035593005" sldId="266"/>
+            <ac:spMk id="16" creationId="{670CEDEF-4F34-412E-84EE-329C1E936AF5}"/>
+          </ac:spMkLst>
+        </pc:spChg>
+        <pc:spChg chg="add del">
+          <ac:chgData name="CACERES CASTRO XIMENA LIZETH" userId="f563d6b3-b530-416d-a121-a47ff68979ea" providerId="ADAL" clId="{1F03FFFF-2808-4650-8B6F-6016474D36FF}" dt="2022-03-02T17:57:43.558" v="48" actId="26606"/>
+          <ac:spMkLst>
+            <pc:docMk/>
+            <pc:sldMk cId="3035593005" sldId="266"/>
+            <ac:spMk id="18" creationId="{C59AB4C8-9178-4F7A-8404-6890510B5917}"/>
+          </ac:spMkLst>
+        </pc:spChg>
+        <pc:spChg chg="add del">
+          <ac:chgData name="CACERES CASTRO XIMENA LIZETH" userId="f563d6b3-b530-416d-a121-a47ff68979ea" providerId="ADAL" clId="{1F03FFFF-2808-4650-8B6F-6016474D36FF}" dt="2022-03-02T17:57:43.558" v="48" actId="26606"/>
+          <ac:spMkLst>
+            <pc:docMk/>
+            <pc:sldMk cId="3035593005" sldId="266"/>
+            <ac:spMk id="19" creationId="{4CFDFB37-4BC7-42C6-915D-A6609139BFE7}"/>
+          </ac:spMkLst>
+        </pc:spChg>
+        <pc:spChg chg="add del">
+          <ac:chgData name="CACERES CASTRO XIMENA LIZETH" userId="f563d6b3-b530-416d-a121-a47ff68979ea" providerId="ADAL" clId="{1F03FFFF-2808-4650-8B6F-6016474D36FF}" dt="2022-03-02T17:58:09.858" v="57" actId="26606"/>
+          <ac:spMkLst>
+            <pc:docMk/>
+            <pc:sldMk cId="3035593005" sldId="266"/>
+            <ac:spMk id="20" creationId="{007891EC-4501-44ED-A8C8-B11B6DB767AB}"/>
+          </ac:spMkLst>
+        </pc:spChg>
+        <pc:spChg chg="add del">
+          <ac:chgData name="CACERES CASTRO XIMENA LIZETH" userId="f563d6b3-b530-416d-a121-a47ff68979ea" providerId="ADAL" clId="{1F03FFFF-2808-4650-8B6F-6016474D36FF}" dt="2022-03-02T17:57:52.446" v="52" actId="26606"/>
+          <ac:spMkLst>
+            <pc:docMk/>
+            <pc:sldMk cId="3035593005" sldId="266"/>
+            <ac:spMk id="21" creationId="{BCED4D40-4B67-4331-AC48-79B82B4A47D8}"/>
+          </ac:spMkLst>
+        </pc:spChg>
+        <pc:spChg chg="add del">
+          <ac:chgData name="CACERES CASTRO XIMENA LIZETH" userId="f563d6b3-b530-416d-a121-a47ff68979ea" providerId="ADAL" clId="{1F03FFFF-2808-4650-8B6F-6016474D36FF}" dt="2022-03-02T17:57:52.446" v="52" actId="26606"/>
+          <ac:spMkLst>
+            <pc:docMk/>
+            <pc:sldMk cId="3035593005" sldId="266"/>
+            <ac:spMk id="22" creationId="{670CEDEF-4F34-412E-84EE-329C1E936AF5}"/>
+          </ac:spMkLst>
+        </pc:spChg>
+        <pc:picChg chg="add del mod">
+          <ac:chgData name="CACERES CASTRO XIMENA LIZETH" userId="f563d6b3-b530-416d-a121-a47ff68979ea" providerId="ADAL" clId="{1F03FFFF-2808-4650-8B6F-6016474D36FF}" dt="2022-03-02T17:53:57.802" v="31" actId="478"/>
           <ac:picMkLst>
             <pc:docMk/>
-            <pc:sldMk cId="1324508986" sldId="257"/>
-            <ac:picMk id="6" creationId="{3F20750A-6DFB-4AD2-9CE5-8617C2F4C147}"/>
+            <pc:sldMk cId="3035593005" sldId="266"/>
+            <ac:picMk id="5" creationId="{892934FE-CF2A-4390-BE77-667E74ABDE4C}"/>
+          </ac:picMkLst>
+        </pc:picChg>
+        <pc:picChg chg="add del mod">
+          <ac:chgData name="CACERES CASTRO XIMENA LIZETH" userId="f563d6b3-b530-416d-a121-a47ff68979ea" providerId="ADAL" clId="{1F03FFFF-2808-4650-8B6F-6016474D36FF}" dt="2022-03-02T17:58:01.946" v="54" actId="478"/>
+          <ac:picMkLst>
+            <pc:docMk/>
+            <pc:sldMk cId="3035593005" sldId="266"/>
+            <ac:picMk id="9" creationId="{E51270D4-4B09-456E-A81C-0AE91AC49D13}"/>
+          </ac:picMkLst>
+        </pc:picChg>
+        <pc:picChg chg="add mod">
+          <ac:chgData name="CACERES CASTRO XIMENA LIZETH" userId="f563d6b3-b530-416d-a121-a47ff68979ea" providerId="ADAL" clId="{1F03FFFF-2808-4650-8B6F-6016474D36FF}" dt="2022-03-02T17:58:51.498" v="67" actId="14100"/>
+          <ac:picMkLst>
+            <pc:docMk/>
+            <pc:sldMk cId="3035593005" sldId="266"/>
+            <ac:picMk id="13" creationId="{F053B2A1-8E00-47DF-83C5-145B324C1411}"/>
+          </ac:picMkLst>
+        </pc:picChg>
+        <pc:picChg chg="add del">
+          <ac:chgData name="CACERES CASTRO XIMENA LIZETH" userId="f563d6b3-b530-416d-a121-a47ff68979ea" providerId="ADAL" clId="{1F03FFFF-2808-4650-8B6F-6016474D36FF}" dt="2022-03-02T17:58:09.858" v="57" actId="26606"/>
+          <ac:picMkLst>
+            <pc:docMk/>
+            <pc:sldMk cId="3035593005" sldId="266"/>
+            <ac:picMk id="17" creationId="{1EE138C5-94B5-4340-A108-97AEC6E7A60D}"/>
+          </ac:picMkLst>
+        </pc:picChg>
+      </pc:sldChg>
+      <pc:sldChg chg="addSp delSp modSp mod">
+        <pc:chgData name="CACERES CASTRO XIMENA LIZETH" userId="f563d6b3-b530-416d-a121-a47ff68979ea" providerId="ADAL" clId="{1F03FFFF-2808-4650-8B6F-6016474D36FF}" dt="2022-03-10T03:53:25.513" v="244" actId="14100"/>
+        <pc:sldMkLst>
+          <pc:docMk/>
+          <pc:sldMk cId="1904506013" sldId="269"/>
+        </pc:sldMkLst>
+        <pc:spChg chg="add del mod">
+          <ac:chgData name="CACERES CASTRO XIMENA LIZETH" userId="f563d6b3-b530-416d-a121-a47ff68979ea" providerId="ADAL" clId="{1F03FFFF-2808-4650-8B6F-6016474D36FF}" dt="2022-03-10T03:51:58.470" v="188"/>
+          <ac:spMkLst>
+            <pc:docMk/>
+            <pc:sldMk cId="1904506013" sldId="269"/>
+            <ac:spMk id="5" creationId="{9BE342B4-F51A-42C9-A8E5-E41878427ED9}"/>
+          </ac:spMkLst>
+        </pc:spChg>
+        <pc:spChg chg="add mod">
+          <ac:chgData name="CACERES CASTRO XIMENA LIZETH" userId="f563d6b3-b530-416d-a121-a47ff68979ea" providerId="ADAL" clId="{1F03FFFF-2808-4650-8B6F-6016474D36FF}" dt="2022-03-10T03:53:11.201" v="241" actId="26606"/>
+          <ac:spMkLst>
+            <pc:docMk/>
+            <pc:sldMk cId="1904506013" sldId="269"/>
+            <ac:spMk id="6" creationId="{BF299DA2-19BF-405F-846B-2398F3625782}"/>
+          </ac:spMkLst>
+        </pc:spChg>
+        <pc:picChg chg="del mod">
+          <ac:chgData name="CACERES CASTRO XIMENA LIZETH" userId="f563d6b3-b530-416d-a121-a47ff68979ea" providerId="ADAL" clId="{1F03FFFF-2808-4650-8B6F-6016474D36FF}" dt="2022-03-10T03:50:18.772" v="163" actId="478"/>
+          <ac:picMkLst>
+            <pc:docMk/>
+            <pc:sldMk cId="1904506013" sldId="269"/>
+            <ac:picMk id="2" creationId="{41B60D9D-F32C-4CB3-AB94-761938FF046D}"/>
+          </ac:picMkLst>
+        </pc:picChg>
+        <pc:picChg chg="add mod ord modCrop">
+          <ac:chgData name="CACERES CASTRO XIMENA LIZETH" userId="f563d6b3-b530-416d-a121-a47ff68979ea" providerId="ADAL" clId="{1F03FFFF-2808-4650-8B6F-6016474D36FF}" dt="2022-03-10T03:53:25.513" v="244" actId="14100"/>
+          <ac:picMkLst>
+            <pc:docMk/>
+            <pc:sldMk cId="1904506013" sldId="269"/>
+            <ac:picMk id="4" creationId="{4CA6DE21-E58C-4889-86FD-58975702BE38}"/>
+          </ac:picMkLst>
+        </pc:picChg>
+      </pc:sldChg>
+      <pc:sldChg chg="new del">
+        <pc:chgData name="CACERES CASTRO XIMENA LIZETH" userId="f563d6b3-b530-416d-a121-a47ff68979ea" providerId="ADAL" clId="{1F03FFFF-2808-4650-8B6F-6016474D36FF}" dt="2022-03-10T03:53:34.803" v="246" actId="680"/>
+        <pc:sldMkLst>
+          <pc:docMk/>
+          <pc:sldMk cId="2908027269" sldId="270"/>
+        </pc:sldMkLst>
+      </pc:sldChg>
+      <pc:sldChg chg="addSp delSp modSp new mod">
+        <pc:chgData name="CACERES CASTRO XIMENA LIZETH" userId="f563d6b3-b530-416d-a121-a47ff68979ea" providerId="ADAL" clId="{1F03FFFF-2808-4650-8B6F-6016474D36FF}" dt="2022-03-10T04:01:08.211" v="284" actId="962"/>
+        <pc:sldMkLst>
+          <pc:docMk/>
+          <pc:sldMk cId="4052382930" sldId="270"/>
+        </pc:sldMkLst>
+        <pc:spChg chg="add del mod">
+          <ac:chgData name="CACERES CASTRO XIMENA LIZETH" userId="f563d6b3-b530-416d-a121-a47ff68979ea" providerId="ADAL" clId="{1F03FFFF-2808-4650-8B6F-6016474D36FF}" dt="2022-03-10T03:58:32.507" v="266"/>
+          <ac:spMkLst>
+            <pc:docMk/>
+            <pc:sldMk cId="4052382930" sldId="270"/>
+            <ac:spMk id="4" creationId="{C937290C-6C35-4412-B167-6A9F438107C2}"/>
+          </ac:spMkLst>
+        </pc:spChg>
+        <pc:picChg chg="add del mod modCrop">
+          <ac:chgData name="CACERES CASTRO XIMENA LIZETH" userId="f563d6b3-b530-416d-a121-a47ff68979ea" providerId="ADAL" clId="{1F03FFFF-2808-4650-8B6F-6016474D36FF}" dt="2022-03-10T04:00:55.470" v="280" actId="478"/>
+          <ac:picMkLst>
+            <pc:docMk/>
+            <pc:sldMk cId="4052382930" sldId="270"/>
+            <ac:picMk id="3" creationId="{CAAF64BC-2ED4-4076-853A-F9A1BB3DF69F}"/>
+          </ac:picMkLst>
+        </pc:picChg>
+        <pc:picChg chg="add del mod modCrop">
+          <ac:chgData name="CACERES CASTRO XIMENA LIZETH" userId="f563d6b3-b530-416d-a121-a47ff68979ea" providerId="ADAL" clId="{1F03FFFF-2808-4650-8B6F-6016474D36FF}" dt="2022-03-10T04:00:57.009" v="281" actId="478"/>
+          <ac:picMkLst>
+            <pc:docMk/>
+            <pc:sldMk cId="4052382930" sldId="270"/>
+            <ac:picMk id="6" creationId="{F5906F91-4D0D-4386-A6FA-A96C718AB661}"/>
+          </ac:picMkLst>
+        </pc:picChg>
+        <pc:picChg chg="add mod">
+          <ac:chgData name="CACERES CASTRO XIMENA LIZETH" userId="f563d6b3-b530-416d-a121-a47ff68979ea" providerId="ADAL" clId="{1F03FFFF-2808-4650-8B6F-6016474D36FF}" dt="2022-03-10T04:01:08.211" v="284" actId="962"/>
+          <ac:picMkLst>
+            <pc:docMk/>
+            <pc:sldMk cId="4052382930" sldId="270"/>
+            <ac:picMk id="8" creationId="{B3094855-D0A6-44BB-AFCF-0B51D35E99E9}"/>
+          </ac:picMkLst>
+        </pc:picChg>
+      </pc:sldChg>
+      <pc:sldChg chg="addSp modSp new mod">
+        <pc:chgData name="CACERES CASTRO XIMENA LIZETH" userId="f563d6b3-b530-416d-a121-a47ff68979ea" providerId="ADAL" clId="{1F03FFFF-2808-4650-8B6F-6016474D36FF}" dt="2022-03-10T04:01:31.860" v="288" actId="962"/>
+        <pc:sldMkLst>
+          <pc:docMk/>
+          <pc:sldMk cId="690894088" sldId="271"/>
+        </pc:sldMkLst>
+        <pc:picChg chg="add mod">
+          <ac:chgData name="CACERES CASTRO XIMENA LIZETH" userId="f563d6b3-b530-416d-a121-a47ff68979ea" providerId="ADAL" clId="{1F03FFFF-2808-4650-8B6F-6016474D36FF}" dt="2022-03-10T04:01:31.860" v="288" actId="962"/>
+          <ac:picMkLst>
+            <pc:docMk/>
+            <pc:sldMk cId="690894088" sldId="271"/>
+            <ac:picMk id="3" creationId="{F98EBD38-C899-4116-BCFB-0781BCD6E900}"/>
           </ac:picMkLst>
         </pc:picChg>
       </pc:sldChg>
@@ -1525,77 +1596,6 @@
             <ac:picMk id="4" creationId="{EFC940BF-A144-4037-AF17-E24E0F53D4DB}"/>
           </ac:picMkLst>
         </pc:picChg>
-      </pc:sldChg>
-    </pc:docChg>
-  </pc:docChgLst>
-  <pc:docChgLst>
-    <pc:chgData name="Usuario invitado" userId="S::urn:spo:anon#641744186c5fce3e36a647224ab405501d2fc04b1dc5538135e19fe1c18a87a6::" providerId="AD" clId="Web-{1EA1F652-A610-43F8-84E3-091BB8B3A0F4}"/>
-    <pc:docChg chg="addSld">
-      <pc:chgData name="Usuario invitado" userId="S::urn:spo:anon#641744186c5fce3e36a647224ab405501d2fc04b1dc5538135e19fe1c18a87a6::" providerId="AD" clId="Web-{1EA1F652-A610-43F8-84E3-091BB8B3A0F4}" dt="2022-02-25T20:22:42.628" v="0"/>
-      <pc:docMkLst>
-        <pc:docMk/>
-      </pc:docMkLst>
-      <pc:sldChg chg="new">
-        <pc:chgData name="Usuario invitado" userId="S::urn:spo:anon#641744186c5fce3e36a647224ab405501d2fc04b1dc5538135e19fe1c18a87a6::" providerId="AD" clId="Web-{1EA1F652-A610-43F8-84E3-091BB8B3A0F4}" dt="2022-02-25T20:22:42.628" v="0"/>
-        <pc:sldMkLst>
-          <pc:docMk/>
-          <pc:sldMk cId="883538536" sldId="256"/>
-        </pc:sldMkLst>
-      </pc:sldChg>
-    </pc:docChg>
-  </pc:docChgLst>
-  <pc:docChgLst>
-    <pc:chgData name="Usuario invitado" userId="S::urn:spo:anon#641744186c5fce3e36a647224ab405501d2fc04b1dc5538135e19fe1c18a87a6::" providerId="AD" clId="Web-{578E51C3-6D16-4A4B-BEC4-1136DC97C28D}"/>
-    <pc:docChg chg="addSld modSld">
-      <pc:chgData name="Usuario invitado" userId="S::urn:spo:anon#641744186c5fce3e36a647224ab405501d2fc04b1dc5538135e19fe1c18a87a6::" providerId="AD" clId="Web-{578E51C3-6D16-4A4B-BEC4-1136DC97C28D}" dt="2022-02-27T22:30:46.508" v="37" actId="20577"/>
-      <pc:docMkLst>
-        <pc:docMk/>
-      </pc:docMkLst>
-      <pc:sldChg chg="modSp new">
-        <pc:chgData name="Usuario invitado" userId="S::urn:spo:anon#641744186c5fce3e36a647224ab405501d2fc04b1dc5538135e19fe1c18a87a6::" providerId="AD" clId="Web-{578E51C3-6D16-4A4B-BEC4-1136DC97C28D}" dt="2022-02-27T22:30:33.461" v="33" actId="20577"/>
-        <pc:sldMkLst>
-          <pc:docMk/>
-          <pc:sldMk cId="1796714290" sldId="264"/>
-        </pc:sldMkLst>
-        <pc:spChg chg="mod">
-          <ac:chgData name="Usuario invitado" userId="S::urn:spo:anon#641744186c5fce3e36a647224ab405501d2fc04b1dc5538135e19fe1c18a87a6::" providerId="AD" clId="Web-{578E51C3-6D16-4A4B-BEC4-1136DC97C28D}" dt="2022-02-27T22:12:01.317" v="13" actId="20577"/>
-          <ac:spMkLst>
-            <pc:docMk/>
-            <pc:sldMk cId="1796714290" sldId="264"/>
-            <ac:spMk id="2" creationId="{FD4557E2-C4D0-4E10-9F91-29113A7F0DA5}"/>
-          </ac:spMkLst>
-        </pc:spChg>
-        <pc:spChg chg="mod">
-          <ac:chgData name="Usuario invitado" userId="S::urn:spo:anon#641744186c5fce3e36a647224ab405501d2fc04b1dc5538135e19fe1c18a87a6::" providerId="AD" clId="Web-{578E51C3-6D16-4A4B-BEC4-1136DC97C28D}" dt="2022-02-27T22:30:33.461" v="33" actId="20577"/>
-          <ac:spMkLst>
-            <pc:docMk/>
-            <pc:sldMk cId="1796714290" sldId="264"/>
-            <ac:spMk id="3" creationId="{FBC0CC10-2E4D-4F58-9470-3AF9AB02377B}"/>
-          </ac:spMkLst>
-        </pc:spChg>
-      </pc:sldChg>
-      <pc:sldChg chg="modSp new">
-        <pc:chgData name="Usuario invitado" userId="S::urn:spo:anon#641744186c5fce3e36a647224ab405501d2fc04b1dc5538135e19fe1c18a87a6::" providerId="AD" clId="Web-{578E51C3-6D16-4A4B-BEC4-1136DC97C28D}" dt="2022-02-27T22:30:46.508" v="37" actId="20577"/>
-        <pc:sldMkLst>
-          <pc:docMk/>
-          <pc:sldMk cId="2610895302" sldId="265"/>
-        </pc:sldMkLst>
-        <pc:spChg chg="mod">
-          <ac:chgData name="Usuario invitado" userId="S::urn:spo:anon#641744186c5fce3e36a647224ab405501d2fc04b1dc5538135e19fe1c18a87a6::" providerId="AD" clId="Web-{578E51C3-6D16-4A4B-BEC4-1136DC97C28D}" dt="2022-02-27T22:12:33.349" v="31" actId="20577"/>
-          <ac:spMkLst>
-            <pc:docMk/>
-            <pc:sldMk cId="2610895302" sldId="265"/>
-            <ac:spMk id="2" creationId="{FD45C9A1-C0FE-484E-A43E-DD798059A690}"/>
-          </ac:spMkLst>
-        </pc:spChg>
-        <pc:spChg chg="mod">
-          <ac:chgData name="Usuario invitado" userId="S::urn:spo:anon#641744186c5fce3e36a647224ab405501d2fc04b1dc5538135e19fe1c18a87a6::" providerId="AD" clId="Web-{578E51C3-6D16-4A4B-BEC4-1136DC97C28D}" dt="2022-02-27T22:30:46.508" v="37" actId="20577"/>
-          <ac:spMkLst>
-            <pc:docMk/>
-            <pc:sldMk cId="2610895302" sldId="265"/>
-            <ac:spMk id="3" creationId="{AB04D9CD-5536-4DA9-8D3A-31F8F173D6E9}"/>
-          </ac:spMkLst>
-        </pc:spChg>
       </pc:sldChg>
     </pc:docChg>
   </pc:docChgLst>
@@ -1684,7 +1684,7 @@
           <a:p>
             <a:fld id="{B88EDFB1-67F8-4517-8E5F-6538FB7C8B40}" type="datetimeFigureOut">
               <a:rPr lang="en-US" smtClean="0"/>
-              <a:t>10-Mar-22</a:t>
+              <a:t>15-Mar-22</a:t>
             </a:fld>
             <a:endParaRPr lang="en-US"/>
           </a:p>
@@ -2292,7 +2292,7 @@
           <a:p>
             <a:fld id="{40771E8B-6CA5-40B2-8038-0E112F3DAC1C}" type="datetimeFigureOut">
               <a:rPr lang="es-ES" smtClean="0"/>
-              <a:t>10/03/2022</a:t>
+              <a:t>15/03/2022</a:t>
             </a:fld>
             <a:endParaRPr lang="es-ES"/>
           </a:p>
@@ -2460,7 +2460,7 @@
           <a:p>
             <a:fld id="{40771E8B-6CA5-40B2-8038-0E112F3DAC1C}" type="datetimeFigureOut">
               <a:rPr lang="es-ES" smtClean="0"/>
-              <a:t>10/03/2022</a:t>
+              <a:t>15/03/2022</a:t>
             </a:fld>
             <a:endParaRPr lang="es-ES"/>
           </a:p>
@@ -2638,7 +2638,7 @@
           <a:p>
             <a:fld id="{40771E8B-6CA5-40B2-8038-0E112F3DAC1C}" type="datetimeFigureOut">
               <a:rPr lang="es-ES" smtClean="0"/>
-              <a:t>10/03/2022</a:t>
+              <a:t>15/03/2022</a:t>
             </a:fld>
             <a:endParaRPr lang="es-ES"/>
           </a:p>
@@ -2806,7 +2806,7 @@
           <a:p>
             <a:fld id="{40771E8B-6CA5-40B2-8038-0E112F3DAC1C}" type="datetimeFigureOut">
               <a:rPr lang="es-ES" smtClean="0"/>
-              <a:t>10/03/2022</a:t>
+              <a:t>15/03/2022</a:t>
             </a:fld>
             <a:endParaRPr lang="es-ES"/>
           </a:p>
@@ -3051,7 +3051,7 @@
           <a:p>
             <a:fld id="{40771E8B-6CA5-40B2-8038-0E112F3DAC1C}" type="datetimeFigureOut">
               <a:rPr lang="es-ES" smtClean="0"/>
-              <a:t>10/03/2022</a:t>
+              <a:t>15/03/2022</a:t>
             </a:fld>
             <a:endParaRPr lang="es-ES"/>
           </a:p>
@@ -3280,7 +3280,7 @@
           <a:p>
             <a:fld id="{40771E8B-6CA5-40B2-8038-0E112F3DAC1C}" type="datetimeFigureOut">
               <a:rPr lang="es-ES" smtClean="0"/>
-              <a:t>10/03/2022</a:t>
+              <a:t>15/03/2022</a:t>
             </a:fld>
             <a:endParaRPr lang="es-ES"/>
           </a:p>
@@ -3644,7 +3644,7 @@
           <a:p>
             <a:fld id="{40771E8B-6CA5-40B2-8038-0E112F3DAC1C}" type="datetimeFigureOut">
               <a:rPr lang="es-ES" smtClean="0"/>
-              <a:t>10/03/2022</a:t>
+              <a:t>15/03/2022</a:t>
             </a:fld>
             <a:endParaRPr lang="es-ES"/>
           </a:p>
@@ -3761,7 +3761,7 @@
           <a:p>
             <a:fld id="{40771E8B-6CA5-40B2-8038-0E112F3DAC1C}" type="datetimeFigureOut">
               <a:rPr lang="es-ES" smtClean="0"/>
-              <a:t>10/03/2022</a:t>
+              <a:t>15/03/2022</a:t>
             </a:fld>
             <a:endParaRPr lang="es-ES"/>
           </a:p>
@@ -3856,7 +3856,7 @@
           <a:p>
             <a:fld id="{40771E8B-6CA5-40B2-8038-0E112F3DAC1C}" type="datetimeFigureOut">
               <a:rPr lang="es-ES" smtClean="0"/>
-              <a:t>10/03/2022</a:t>
+              <a:t>15/03/2022</a:t>
             </a:fld>
             <a:endParaRPr lang="es-ES"/>
           </a:p>
@@ -4131,7 +4131,7 @@
           <a:p>
             <a:fld id="{40771E8B-6CA5-40B2-8038-0E112F3DAC1C}" type="datetimeFigureOut">
               <a:rPr lang="es-ES" smtClean="0"/>
-              <a:t>10/03/2022</a:t>
+              <a:t>15/03/2022</a:t>
             </a:fld>
             <a:endParaRPr lang="es-ES"/>
           </a:p>
@@ -4383,7 +4383,7 @@
           <a:p>
             <a:fld id="{40771E8B-6CA5-40B2-8038-0E112F3DAC1C}" type="datetimeFigureOut">
               <a:rPr lang="es-ES" smtClean="0"/>
-              <a:t>10/03/2022</a:t>
+              <a:t>15/03/2022</a:t>
             </a:fld>
             <a:endParaRPr lang="es-ES"/>
           </a:p>
@@ -4594,7 +4594,7 @@
           <a:p>
             <a:fld id="{40771E8B-6CA5-40B2-8038-0E112F3DAC1C}" type="datetimeFigureOut">
               <a:rPr lang="es-ES" smtClean="0"/>
-              <a:t>10/03/2022</a:t>
+              <a:t>15/03/2022</a:t>
             </a:fld>
             <a:endParaRPr lang="es-ES"/>
           </a:p>
@@ -6237,10 +6237,10 @@
       </p:sp>
       <p:pic>
         <p:nvPicPr>
-          <p:cNvPr id="9" name="Marcador de contenido 8">
+          <p:cNvPr id="6" name="Marcador de contenido 5">
             <a:extLst>
               <a:ext uri="{FF2B5EF4-FFF2-40B4-BE49-F238E27FC236}">
-                <a16:creationId xmlns:a16="http://schemas.microsoft.com/office/drawing/2014/main" id="{A68C46B8-3C2F-4599-88BE-4F700110437D}"/>
+                <a16:creationId xmlns:a16="http://schemas.microsoft.com/office/drawing/2014/main" id="{A6C5154C-A6BA-4D4D-9147-456285AD8A54}"/>
               </a:ext>
             </a:extLst>
           </p:cNvPr>
@@ -6259,8 +6259,8 @@
         </p:blipFill>
         <p:spPr>
           <a:xfrm>
-            <a:off x="139649" y="553206"/>
-            <a:ext cx="11912701" cy="6185608"/>
+            <a:off x="335050" y="553206"/>
+            <a:ext cx="11521897" cy="6195354"/>
           </a:xfrm>
         </p:spPr>
       </p:pic>
@@ -6366,10 +6366,10 @@
       </p:sp>
       <p:pic>
         <p:nvPicPr>
-          <p:cNvPr id="7" name="Marcador de contenido 6">
+          <p:cNvPr id="6" name="Marcador de contenido 5">
             <a:extLst>
               <a:ext uri="{FF2B5EF4-FFF2-40B4-BE49-F238E27FC236}">
-                <a16:creationId xmlns:a16="http://schemas.microsoft.com/office/drawing/2014/main" id="{E89B67EF-6FF0-488C-AAEF-BEFD1468711F}"/>
+                <a16:creationId xmlns:a16="http://schemas.microsoft.com/office/drawing/2014/main" id="{27F0B3F2-3965-4A34-B8E7-8041B0B90CE0}"/>
               </a:ext>
             </a:extLst>
           </p:cNvPr>
@@ -6388,8 +6388,8 @@
         </p:blipFill>
         <p:spPr>
           <a:xfrm>
-            <a:off x="0" y="649968"/>
-            <a:ext cx="12064482" cy="6241972"/>
+            <a:off x="187174" y="577200"/>
+            <a:ext cx="11830478" cy="6147366"/>
           </a:xfrm>
         </p:spPr>
       </p:pic>
@@ -6476,10 +6476,10 @@
       </p:sp>
       <p:pic>
         <p:nvPicPr>
-          <p:cNvPr id="5" name="Marcador de contenido 4">
+          <p:cNvPr id="7" name="Marcador de contenido 6">
             <a:extLst>
               <a:ext uri="{FF2B5EF4-FFF2-40B4-BE49-F238E27FC236}">
-                <a16:creationId xmlns:a16="http://schemas.microsoft.com/office/drawing/2014/main" id="{98A2842D-712B-4393-8A18-76B92B686445}"/>
+                <a16:creationId xmlns:a16="http://schemas.microsoft.com/office/drawing/2014/main" id="{0E0D0707-A89C-45C7-A45B-17FDD8882E78}"/>
               </a:ext>
             </a:extLst>
           </p:cNvPr>
@@ -6498,8 +6498,8 @@
         </p:blipFill>
         <p:spPr>
           <a:xfrm>
-            <a:off x="668733" y="462179"/>
-            <a:ext cx="9700685" cy="6395821"/>
+            <a:off x="465083" y="632405"/>
+            <a:ext cx="10781542" cy="6159408"/>
           </a:xfrm>
         </p:spPr>
       </p:pic>

</xml_diff>